<commit_message>
GraalVM Upgrade PPT v3
</commit_message>
<xml_diff>
--- a/doc/reference/GraalVm _Upgrade.pptx
+++ b/doc/reference/GraalVm _Upgrade.pptx
@@ -26,8 +26,14 @@
     <p:sldId id="292" r:id="rId20"/>
     <p:sldId id="293" r:id="rId21"/>
     <p:sldId id="289" r:id="rId22"/>
-    <p:sldId id="290" r:id="rId23"/>
-    <p:sldId id="273" r:id="rId24"/>
+    <p:sldId id="294" r:id="rId23"/>
+    <p:sldId id="295" r:id="rId24"/>
+    <p:sldId id="296" r:id="rId25"/>
+    <p:sldId id="297" r:id="rId26"/>
+    <p:sldId id="298" r:id="rId27"/>
+    <p:sldId id="299" r:id="rId28"/>
+    <p:sldId id="290" r:id="rId29"/>
+    <p:sldId id="273" r:id="rId30"/>
   </p:sldIdLst>
   <p:sldSz cx="12192000" cy="6858000"/>
   <p:notesSz cx="6858000" cy="9144000"/>
@@ -856,7 +862,7 @@
           <a:p>
             <a:fld id="{4AAD347D-5ACD-4C99-B74B-A9C85AD731AF}" type="datetimeFigureOut">
               <a:rPr lang="en-US" smtClean="0"/>
-              <a:t>10/20/2022</a:t>
+              <a:t>10/25/2022</a:t>
             </a:fld>
             <a:endParaRPr lang="en-US" dirty="0"/>
           </a:p>
@@ -1107,7 +1113,7 @@
           <a:p>
             <a:fld id="{4AAD347D-5ACD-4C99-B74B-A9C85AD731AF}" type="datetimeFigureOut">
               <a:rPr lang="en-US" smtClean="0"/>
-              <a:t>10/20/2022</a:t>
+              <a:t>10/25/2022</a:t>
             </a:fld>
             <a:endParaRPr lang="en-US" dirty="0"/>
           </a:p>
@@ -1422,7 +1428,7 @@
           <a:p>
             <a:fld id="{4AAD347D-5ACD-4C99-B74B-A9C85AD731AF}" type="datetimeFigureOut">
               <a:rPr lang="en-US" smtClean="0"/>
-              <a:t>10/20/2022</a:t>
+              <a:t>10/25/2022</a:t>
             </a:fld>
             <a:endParaRPr lang="en-US" dirty="0"/>
           </a:p>
@@ -1764,7 +1770,7 @@
           <a:p>
             <a:fld id="{4509A250-FF31-4206-8172-F9D3106AACB1}" type="datetimeFigureOut">
               <a:rPr lang="en-US" smtClean="0"/>
-              <a:t>10/20/2022</a:t>
+              <a:t>10/25/2022</a:t>
             </a:fld>
             <a:endParaRPr lang="en-US" dirty="0"/>
           </a:p>
@@ -2078,7 +2084,7 @@
           <a:p>
             <a:fld id="{4AAD347D-5ACD-4C99-B74B-A9C85AD731AF}" type="datetimeFigureOut">
               <a:rPr lang="en-US" smtClean="0"/>
-              <a:t>10/20/2022</a:t>
+              <a:t>10/25/2022</a:t>
             </a:fld>
             <a:endParaRPr lang="en-US" dirty="0"/>
           </a:p>
@@ -2472,7 +2478,7 @@
           <a:p>
             <a:fld id="{4AAD347D-5ACD-4C99-B74B-A9C85AD731AF}" type="datetimeFigureOut">
               <a:rPr lang="en-US" smtClean="0"/>
-              <a:t>10/20/2022</a:t>
+              <a:t>10/25/2022</a:t>
             </a:fld>
             <a:endParaRPr lang="en-US" dirty="0"/>
           </a:p>
@@ -2643,7 +2649,7 @@
           <a:p>
             <a:fld id="{4509A250-FF31-4206-8172-F9D3106AACB1}" type="datetimeFigureOut">
               <a:rPr lang="en-US" smtClean="0"/>
-              <a:t>10/20/2022</a:t>
+              <a:t>10/25/2022</a:t>
             </a:fld>
             <a:endParaRPr lang="en-US" dirty="0"/>
           </a:p>
@@ -2823,7 +2829,7 @@
           <a:p>
             <a:fld id="{4509A250-FF31-4206-8172-F9D3106AACB1}" type="datetimeFigureOut">
               <a:rPr lang="en-US" smtClean="0"/>
-              <a:t>10/20/2022</a:t>
+              <a:t>10/25/2022</a:t>
             </a:fld>
             <a:endParaRPr lang="en-US" dirty="0"/>
           </a:p>
@@ -2999,7 +3005,7 @@
           <a:p>
             <a:fld id="{4509A250-FF31-4206-8172-F9D3106AACB1}" type="datetimeFigureOut">
               <a:rPr lang="en-US" smtClean="0"/>
-              <a:t>10/20/2022</a:t>
+              <a:t>10/25/2022</a:t>
             </a:fld>
             <a:endParaRPr lang="en-US" dirty="0"/>
           </a:p>
@@ -3246,7 +3252,7 @@
           <a:p>
             <a:fld id="{9796027F-7875-4030-9381-8BD8C4F21935}" type="datetimeFigureOut">
               <a:rPr lang="en-US" smtClean="0"/>
-              <a:t>10/20/2022</a:t>
+              <a:t>10/25/2022</a:t>
             </a:fld>
             <a:endParaRPr lang="en-US" dirty="0"/>
           </a:p>
@@ -3478,7 +3484,7 @@
           <a:p>
             <a:fld id="{9796027F-7875-4030-9381-8BD8C4F21935}" type="datetimeFigureOut">
               <a:rPr lang="en-US" smtClean="0"/>
-              <a:t>10/20/2022</a:t>
+              <a:t>10/25/2022</a:t>
             </a:fld>
             <a:endParaRPr lang="en-US" dirty="0"/>
           </a:p>
@@ -3852,7 +3858,7 @@
           <a:p>
             <a:fld id="{9796027F-7875-4030-9381-8BD8C4F21935}" type="datetimeFigureOut">
               <a:rPr lang="en-US" smtClean="0"/>
-              <a:t>10/20/2022</a:t>
+              <a:t>10/25/2022</a:t>
             </a:fld>
             <a:endParaRPr lang="en-US" dirty="0"/>
           </a:p>
@@ -3975,7 +3981,7 @@
           <a:p>
             <a:fld id="{4509A250-FF31-4206-8172-F9D3106AACB1}" type="datetimeFigureOut">
               <a:rPr lang="en-US" smtClean="0"/>
-              <a:t>10/20/2022</a:t>
+              <a:t>10/25/2022</a:t>
             </a:fld>
             <a:endParaRPr lang="en-US" dirty="0"/>
           </a:p>
@@ -4070,7 +4076,7 @@
           <a:p>
             <a:fld id="{4509A250-FF31-4206-8172-F9D3106AACB1}" type="datetimeFigureOut">
               <a:rPr lang="en-US" smtClean="0"/>
-              <a:t>10/20/2022</a:t>
+              <a:t>10/25/2022</a:t>
             </a:fld>
             <a:endParaRPr lang="en-US" dirty="0"/>
           </a:p>
@@ -4325,7 +4331,7 @@
           <a:p>
             <a:fld id="{4509A250-FF31-4206-8172-F9D3106AACB1}" type="datetimeFigureOut">
               <a:rPr lang="en-US" smtClean="0"/>
-              <a:t>10/20/2022</a:t>
+              <a:t>10/25/2022</a:t>
             </a:fld>
             <a:endParaRPr lang="en-US" dirty="0"/>
           </a:p>
@@ -4588,7 +4594,7 @@
           <a:p>
             <a:fld id="{4509A250-FF31-4206-8172-F9D3106AACB1}" type="datetimeFigureOut">
               <a:rPr lang="en-US" smtClean="0"/>
-              <a:t>10/20/2022</a:t>
+              <a:t>10/25/2022</a:t>
             </a:fld>
             <a:endParaRPr lang="en-US" dirty="0"/>
           </a:p>
@@ -5331,7 +5337,7 @@
           <a:p>
             <a:fld id="{4AAD347D-5ACD-4C99-B74B-A9C85AD731AF}" type="datetimeFigureOut">
               <a:rPr lang="en-US" smtClean="0"/>
-              <a:t>10/20/2022</a:t>
+              <a:t>10/25/2022</a:t>
             </a:fld>
             <a:endParaRPr lang="en-US" dirty="0"/>
           </a:p>
@@ -5961,17 +5967,16 @@
           <a:lstStyle/>
           <a:p>
             <a:r>
-              <a:rPr lang="en-US" sz="4800"/>
+              <a:rPr lang="en-US" sz="4800" dirty="0"/>
               <a:t>GraalVM Native Images</a:t>
             </a:r>
             <a:br>
-              <a:rPr lang="en-US" sz="4800"/>
+              <a:rPr lang="en-US" sz="4800" dirty="0"/>
             </a:br>
             <a:r>
               <a:rPr lang="en-US" sz="4800" dirty="0"/>
               <a:t>With Java 17</a:t>
             </a:r>
-            <a:endParaRPr lang="en-US" sz="4800"/>
           </a:p>
         </p:txBody>
       </p:sp>
@@ -6827,12 +6832,8 @@
           <a:lstStyle/>
           <a:p>
             <a:r>
-              <a:rPr lang="en-US" dirty="0" err="1"/>
-              <a:t>GraalVM</a:t>
-            </a:r>
-            <a:r>
-              <a:rPr lang="en-US" dirty="0"/>
-              <a:t> Overview</a:t>
+              <a:rPr lang="en-US" dirty="0"/>
+              <a:t>GraalVM Overview</a:t>
             </a:r>
           </a:p>
         </p:txBody>
@@ -6904,7 +6905,7 @@
             </a:pPr>
             <a:r>
               <a:rPr lang="en-US" dirty="0"/>
-              <a:t>Written in Java and supporting any program in any language</a:t>
+              <a:t>Written in Java with goal to support any program in any language</a:t>
             </a:r>
           </a:p>
           <a:p>
@@ -6987,12 +6988,8 @@
           <a:lstStyle/>
           <a:p>
             <a:r>
-              <a:rPr lang="en-US" dirty="0" err="1"/>
-              <a:t>GraalVM</a:t>
-            </a:r>
-            <a:r>
-              <a:rPr lang="en-US" dirty="0"/>
-              <a:t> Overview </a:t>
+              <a:rPr lang="en-US" dirty="0"/>
+              <a:t>GraalVM Overview </a:t>
             </a:r>
             <a:r>
               <a:rPr lang="en-US" sz="1800" dirty="0"/>
@@ -7230,12 +7227,8 @@
           <a:lstStyle/>
           <a:p>
             <a:r>
-              <a:rPr lang="en-US" dirty="0" err="1"/>
-              <a:t>GraalVM</a:t>
-            </a:r>
-            <a:r>
-              <a:rPr lang="en-US" dirty="0"/>
-              <a:t> Overview </a:t>
+              <a:rPr lang="en-US" dirty="0"/>
+              <a:t>GraalVM Overview </a:t>
             </a:r>
             <a:r>
               <a:rPr lang="en-US" sz="1800" dirty="0"/>
@@ -7413,12 +7406,8 @@
           <a:lstStyle/>
           <a:p>
             <a:r>
-              <a:rPr lang="en-US" dirty="0" err="1"/>
-              <a:t>GraalVM</a:t>
-            </a:r>
-            <a:r>
-              <a:rPr lang="en-US" dirty="0"/>
-              <a:t> Overview </a:t>
+              <a:rPr lang="en-US" dirty="0"/>
+              <a:t>GraalVM Overview </a:t>
             </a:r>
             <a:r>
               <a:rPr lang="en-US" sz="1800" dirty="0"/>
@@ -7716,7 +7705,7 @@
             </a:pPr>
             <a:r>
               <a:rPr lang="en-US" dirty="0"/>
-              <a:t>Compiled into target’s machine language</a:t>
+              <a:t>Takes Java bytecode as input and creates a binary executable as output</a:t>
             </a:r>
           </a:p>
           <a:p>
@@ -7726,7 +7715,7 @@
             </a:pPr>
             <a:r>
               <a:rPr lang="en-US" dirty="0"/>
-              <a:t>No JVM</a:t>
+              <a:t>No JVM unless using a fallback file (more later)</a:t>
             </a:r>
           </a:p>
           <a:p>
@@ -7767,6 +7756,56 @@
             <a:r>
               <a:rPr lang="en-US" dirty="0"/>
               <a:t>Machine language == faster sustained performance</a:t>
+            </a:r>
+          </a:p>
+          <a:p>
+            <a:pPr lvl="1">
+              <a:buFont typeface="Wingdings" panose="05000000000000000000" pitchFamily="2" charset="2"/>
+              <a:buChar char="Ø"/>
+            </a:pPr>
+            <a:r>
+              <a:rPr lang="en-US" dirty="0"/>
+              <a:t>Use a fraction of the resources required by the JVM, so cheaper to run</a:t>
+            </a:r>
+          </a:p>
+          <a:p>
+            <a:pPr lvl="1">
+              <a:buFont typeface="Wingdings" panose="05000000000000000000" pitchFamily="2" charset="2"/>
+              <a:buChar char="Ø"/>
+            </a:pPr>
+            <a:r>
+              <a:rPr lang="en-US" dirty="0"/>
+              <a:t>Starts in milliseconds</a:t>
+            </a:r>
+          </a:p>
+          <a:p>
+            <a:pPr lvl="1">
+              <a:buFont typeface="Wingdings" panose="05000000000000000000" pitchFamily="2" charset="2"/>
+              <a:buChar char="Ø"/>
+            </a:pPr>
+            <a:r>
+              <a:rPr lang="en-US" dirty="0"/>
+              <a:t>Deliver peak performance immediately, no warmup</a:t>
+            </a:r>
+          </a:p>
+          <a:p>
+            <a:pPr lvl="1">
+              <a:buFont typeface="Wingdings" panose="05000000000000000000" pitchFamily="2" charset="2"/>
+              <a:buChar char="Ø"/>
+            </a:pPr>
+            <a:r>
+              <a:rPr lang="en-US" dirty="0"/>
+              <a:t>Can be packaged into lightweight container images for faster and more efficient deployments</a:t>
+            </a:r>
+          </a:p>
+          <a:p>
+            <a:pPr lvl="1">
+              <a:buFont typeface="Wingdings" panose="05000000000000000000" pitchFamily="2" charset="2"/>
+              <a:buChar char="Ø"/>
+            </a:pPr>
+            <a:r>
+              <a:rPr lang="en-US" dirty="0"/>
+              <a:t>Reduced attack surface</a:t>
             </a:r>
           </a:p>
           <a:p>
@@ -7864,7 +7903,9 @@
           </a:xfrm>
         </p:spPr>
         <p:txBody>
-          <a:bodyPr/>
+          <a:bodyPr>
+            <a:normAutofit/>
+          </a:bodyPr>
           <a:lstStyle/>
           <a:p>
             <a:r>
@@ -7879,7 +7920,7 @@
             </a:pPr>
             <a:r>
               <a:rPr lang="en-US" dirty="0"/>
-              <a:t>Few resources needed</a:t>
+              <a:t>Fewer resources needed</a:t>
             </a:r>
           </a:p>
           <a:p>
@@ -7920,6 +7961,16 @@
             <a:r>
               <a:rPr lang="en-US" dirty="0"/>
               <a:t>Up to 90% smaller images</a:t>
+            </a:r>
+          </a:p>
+          <a:p>
+            <a:pPr lvl="1">
+              <a:buFont typeface="Wingdings" panose="05000000000000000000" pitchFamily="2" charset="2"/>
+              <a:buChar char="Ø"/>
+            </a:pPr>
+            <a:r>
+              <a:rPr lang="en-US" dirty="0"/>
+              <a:t>No need to keep a microservice in an idle state</a:t>
             </a:r>
           </a:p>
           <a:p>
@@ -8361,9 +8412,20 @@
           <a:p>
             <a:r>
               <a:rPr lang="en-US" dirty="0"/>
-              <a:t>Process Overview</a:t>
-            </a:r>
-            <a:endParaRPr lang="en-US" sz="1800" dirty="0"/>
+              <a:t>Process Overview </a:t>
+            </a:r>
+            <a:r>
+              <a:rPr lang="en-US" sz="1800" dirty="0"/>
+              <a:t>(</a:t>
+            </a:r>
+            <a:r>
+              <a:rPr lang="en-US" sz="1800" dirty="0" err="1"/>
+              <a:t>Cont</a:t>
+            </a:r>
+            <a:r>
+              <a:rPr lang="en-US" sz="1800" dirty="0"/>
+              <a:t>)</a:t>
+            </a:r>
           </a:p>
         </p:txBody>
       </p:sp>
@@ -9412,9 +9474,20 @@
           <a:p>
             <a:r>
               <a:rPr lang="en-US" dirty="0"/>
-              <a:t>Process Overview</a:t>
-            </a:r>
-            <a:endParaRPr lang="en-US" sz="1800" dirty="0"/>
+              <a:t>Process Overview </a:t>
+            </a:r>
+            <a:r>
+              <a:rPr lang="en-US" sz="1800" dirty="0"/>
+              <a:t>(</a:t>
+            </a:r>
+            <a:r>
+              <a:rPr lang="en-US" sz="1800" dirty="0" err="1"/>
+              <a:t>Cont</a:t>
+            </a:r>
+            <a:r>
+              <a:rPr lang="en-US" sz="1800" dirty="0"/>
+              <a:t>)</a:t>
+            </a:r>
           </a:p>
         </p:txBody>
       </p:sp>
@@ -9642,6 +9715,1979 @@
       </p:grpSpPr>
       <p:sp>
         <p:nvSpPr>
+          <p:cNvPr id="2" name="Title 1"/>
+          <p:cNvSpPr>
+            <a:spLocks noGrp="1"/>
+          </p:cNvSpPr>
+          <p:nvPr>
+            <p:ph type="title"/>
+          </p:nvPr>
+        </p:nvSpPr>
+        <p:spPr>
+          <a:xfrm>
+            <a:off x="646111" y="452718"/>
+            <a:ext cx="9404723" cy="910569"/>
+          </a:xfrm>
+        </p:spPr>
+        <p:txBody>
+          <a:bodyPr/>
+          <a:lstStyle/>
+          <a:p>
+            <a:r>
+              <a:rPr lang="en-US" dirty="0"/>
+              <a:t>Native Image Conversion</a:t>
+            </a:r>
+            <a:endParaRPr lang="en-US" sz="1800" dirty="0"/>
+          </a:p>
+        </p:txBody>
+      </p:sp>
+      <p:sp>
+        <p:nvSpPr>
+          <p:cNvPr id="3" name="Content Placeholder 2"/>
+          <p:cNvSpPr>
+            <a:spLocks noGrp="1"/>
+          </p:cNvSpPr>
+          <p:nvPr>
+            <p:ph idx="1"/>
+          </p:nvPr>
+        </p:nvSpPr>
+        <p:spPr>
+          <a:xfrm>
+            <a:off x="646111" y="1363287"/>
+            <a:ext cx="9403743" cy="5120639"/>
+          </a:xfrm>
+        </p:spPr>
+        <p:txBody>
+          <a:bodyPr/>
+          <a:lstStyle/>
+          <a:p>
+            <a:r>
+              <a:rPr lang="en-US" dirty="0"/>
+              <a:t>Background</a:t>
+            </a:r>
+          </a:p>
+          <a:p>
+            <a:pPr lvl="1">
+              <a:buFont typeface="Wingdings" panose="05000000000000000000" pitchFamily="2" charset="2"/>
+              <a:buChar char="Ø"/>
+            </a:pPr>
+            <a:r>
+              <a:rPr lang="en-US" dirty="0"/>
+              <a:t>Closed-world Assumption</a:t>
+            </a:r>
+          </a:p>
+          <a:p>
+            <a:pPr lvl="2">
+              <a:buFont typeface="Wingdings" panose="05000000000000000000" pitchFamily="2" charset="2"/>
+              <a:buChar char="Ø"/>
+            </a:pPr>
+            <a:r>
+              <a:rPr lang="en-US" dirty="0"/>
+              <a:t>All code is known at build time</a:t>
+            </a:r>
+          </a:p>
+          <a:p>
+            <a:pPr lvl="2">
+              <a:buFont typeface="Wingdings" panose="05000000000000000000" pitchFamily="2" charset="2"/>
+              <a:buChar char="Ø"/>
+            </a:pPr>
+            <a:r>
+              <a:rPr lang="en-US" dirty="0"/>
+              <a:t>No new code is loaded at run time</a:t>
+            </a:r>
+          </a:p>
+          <a:p>
+            <a:pPr lvl="1">
+              <a:buFont typeface="Wingdings" panose="05000000000000000000" pitchFamily="2" charset="2"/>
+              <a:buChar char="Ø"/>
+            </a:pPr>
+            <a:r>
+              <a:rPr lang="en-US" dirty="0"/>
+              <a:t>No JVM is normally used</a:t>
+            </a:r>
+          </a:p>
+          <a:p>
+            <a:pPr lvl="2">
+              <a:buFont typeface="Wingdings" panose="05000000000000000000" pitchFamily="2" charset="2"/>
+              <a:buChar char="Ø"/>
+            </a:pPr>
+            <a:r>
+              <a:rPr lang="en-US" dirty="0"/>
+              <a:t>A fallback file may be produced if compiler can’t optimize the image</a:t>
+            </a:r>
+          </a:p>
+          <a:p>
+            <a:pPr lvl="2">
+              <a:buFont typeface="Wingdings" panose="05000000000000000000" pitchFamily="2" charset="2"/>
+              <a:buChar char="Ø"/>
+            </a:pPr>
+            <a:r>
+              <a:rPr lang="en-US" dirty="0"/>
+              <a:t>A fallback requires a JVM to run (not a native image)</a:t>
+            </a:r>
+          </a:p>
+          <a:p>
+            <a:pPr lvl="2">
+              <a:buFont typeface="Wingdings" panose="05000000000000000000" pitchFamily="2" charset="2"/>
+              <a:buChar char="Ø"/>
+            </a:pPr>
+            <a:r>
+              <a:rPr lang="en-US" dirty="0"/>
+              <a:t>Compiler can be told not to generate a fallback file</a:t>
+            </a:r>
+          </a:p>
+          <a:p>
+            <a:pPr lvl="1">
+              <a:buFont typeface="Wingdings" panose="05000000000000000000" pitchFamily="2" charset="2"/>
+              <a:buChar char="Ø"/>
+            </a:pPr>
+            <a:r>
+              <a:rPr lang="en-US" dirty="0"/>
+              <a:t>All reachable code must be known at build time</a:t>
+            </a:r>
+          </a:p>
+          <a:p>
+            <a:pPr lvl="2">
+              <a:buFont typeface="Wingdings" panose="05000000000000000000" pitchFamily="2" charset="2"/>
+              <a:buChar char="Ø"/>
+            </a:pPr>
+            <a:endParaRPr lang="en-US" dirty="0"/>
+          </a:p>
+          <a:p>
+            <a:pPr lvl="2">
+              <a:buFont typeface="Wingdings" panose="05000000000000000000" pitchFamily="2" charset="2"/>
+              <a:buChar char="§"/>
+            </a:pPr>
+            <a:endParaRPr lang="en-US" dirty="0"/>
+          </a:p>
+        </p:txBody>
+      </p:sp>
+    </p:spTree>
+    <p:extLst>
+      <p:ext uri="{BB962C8B-B14F-4D97-AF65-F5344CB8AC3E}">
+        <p14:creationId xmlns:p14="http://schemas.microsoft.com/office/powerpoint/2010/main" val="3040353718"/>
+      </p:ext>
+    </p:extLst>
+  </p:cSld>
+  <p:clrMapOvr>
+    <a:masterClrMapping/>
+  </p:clrMapOvr>
+</p:sld>
+</file>
+
+<file path=ppt/slides/slide23.xml><?xml version="1.0" encoding="utf-8"?>
+<p:sld xmlns:a="http://schemas.openxmlformats.org/drawingml/2006/main" xmlns:r="http://schemas.openxmlformats.org/officeDocument/2006/relationships" xmlns:p="http://schemas.openxmlformats.org/presentationml/2006/main">
+  <p:cSld>
+    <p:spTree>
+      <p:nvGrpSpPr>
+        <p:cNvPr id="1" name=""/>
+        <p:cNvGrpSpPr/>
+        <p:nvPr/>
+      </p:nvGrpSpPr>
+      <p:grpSpPr>
+        <a:xfrm>
+          <a:off x="0" y="0"/>
+          <a:ext cx="0" cy="0"/>
+          <a:chOff x="0" y="0"/>
+          <a:chExt cx="0" cy="0"/>
+        </a:xfrm>
+      </p:grpSpPr>
+      <p:sp>
+        <p:nvSpPr>
+          <p:cNvPr id="2" name="Title 1"/>
+          <p:cNvSpPr>
+            <a:spLocks noGrp="1"/>
+          </p:cNvSpPr>
+          <p:nvPr>
+            <p:ph type="title"/>
+          </p:nvPr>
+        </p:nvSpPr>
+        <p:spPr>
+          <a:xfrm>
+            <a:off x="646111" y="452718"/>
+            <a:ext cx="9404723" cy="910569"/>
+          </a:xfrm>
+        </p:spPr>
+        <p:txBody>
+          <a:bodyPr/>
+          <a:lstStyle/>
+          <a:p>
+            <a:r>
+              <a:rPr lang="en-US" dirty="0"/>
+              <a:t>Native Image Conversion </a:t>
+            </a:r>
+            <a:r>
+              <a:rPr lang="en-US" sz="1800" dirty="0"/>
+              <a:t>(</a:t>
+            </a:r>
+            <a:r>
+              <a:rPr lang="en-US" sz="1800" dirty="0" err="1"/>
+              <a:t>Cont</a:t>
+            </a:r>
+            <a:r>
+              <a:rPr lang="en-US" sz="1800" dirty="0"/>
+              <a:t>)</a:t>
+            </a:r>
+          </a:p>
+        </p:txBody>
+      </p:sp>
+      <p:sp>
+        <p:nvSpPr>
+          <p:cNvPr id="3" name="Content Placeholder 2"/>
+          <p:cNvSpPr>
+            <a:spLocks noGrp="1"/>
+          </p:cNvSpPr>
+          <p:nvPr>
+            <p:ph idx="1"/>
+          </p:nvPr>
+        </p:nvSpPr>
+        <p:spPr>
+          <a:xfrm>
+            <a:off x="646111" y="1363287"/>
+            <a:ext cx="9403743" cy="5120639"/>
+          </a:xfrm>
+        </p:spPr>
+        <p:txBody>
+          <a:bodyPr>
+            <a:normAutofit/>
+          </a:bodyPr>
+          <a:lstStyle/>
+          <a:p>
+            <a:r>
+              <a:rPr lang="en-US" dirty="0"/>
+              <a:t>Background </a:t>
+            </a:r>
+            <a:r>
+              <a:rPr lang="en-US" sz="1100" dirty="0"/>
+              <a:t>(</a:t>
+            </a:r>
+            <a:r>
+              <a:rPr lang="en-US" sz="1100" dirty="0" err="1"/>
+              <a:t>Cont</a:t>
+            </a:r>
+            <a:r>
+              <a:rPr lang="en-US" sz="1100" dirty="0"/>
+              <a:t>)</a:t>
+            </a:r>
+          </a:p>
+          <a:p>
+            <a:pPr lvl="1">
+              <a:buFont typeface="Wingdings" panose="05000000000000000000" pitchFamily="2" charset="2"/>
+              <a:buChar char="Ø"/>
+            </a:pPr>
+            <a:r>
+              <a:rPr lang="en-US" dirty="0"/>
+              <a:t>JVM initializes classes at first use</a:t>
+            </a:r>
+          </a:p>
+          <a:p>
+            <a:pPr lvl="1">
+              <a:buFont typeface="Wingdings" panose="05000000000000000000" pitchFamily="2" charset="2"/>
+              <a:buChar char="Ø"/>
+            </a:pPr>
+            <a:r>
+              <a:rPr lang="en-US" dirty="0"/>
+              <a:t>JVM includes Jar files from the </a:t>
+            </a:r>
+            <a:r>
+              <a:rPr lang="en-US" dirty="0" err="1"/>
+              <a:t>classpath</a:t>
+            </a:r>
+            <a:r>
+              <a:rPr lang="en-US" dirty="0"/>
+              <a:t> that may never be used</a:t>
+            </a:r>
+          </a:p>
+          <a:p>
+            <a:pPr lvl="1">
+              <a:buFont typeface="Wingdings" panose="05000000000000000000" pitchFamily="2" charset="2"/>
+              <a:buChar char="Ø"/>
+            </a:pPr>
+            <a:r>
+              <a:rPr lang="en-US" dirty="0"/>
+              <a:t>NI does not use a JVM</a:t>
+            </a:r>
+          </a:p>
+          <a:p>
+            <a:pPr lvl="2">
+              <a:buFont typeface="Wingdings" panose="05000000000000000000" pitchFamily="2" charset="2"/>
+              <a:buChar char="Ø"/>
+            </a:pPr>
+            <a:r>
+              <a:rPr lang="en-US" dirty="0"/>
+              <a:t>All classes and resources are compiled into a binary image</a:t>
+            </a:r>
+          </a:p>
+          <a:p>
+            <a:pPr lvl="3">
+              <a:buFont typeface="Wingdings" panose="05000000000000000000" pitchFamily="2" charset="2"/>
+              <a:buChar char="Ø"/>
+            </a:pPr>
+            <a:r>
+              <a:rPr lang="en-US" dirty="0"/>
+              <a:t>NI initializes classes at build time</a:t>
+            </a:r>
+          </a:p>
+          <a:p>
+            <a:pPr lvl="4">
+              <a:buFont typeface="Wingdings" panose="05000000000000000000" pitchFamily="2" charset="2"/>
+              <a:buChar char="§"/>
+            </a:pPr>
+            <a:r>
+              <a:rPr lang="en-US" dirty="0"/>
+              <a:t>All static state is compiled at stored at image build time</a:t>
+            </a:r>
+          </a:p>
+          <a:p>
+            <a:pPr lvl="4">
+              <a:buFont typeface="Wingdings" panose="05000000000000000000" pitchFamily="2" charset="2"/>
+              <a:buChar char="§"/>
+            </a:pPr>
+            <a:r>
+              <a:rPr lang="en-US" dirty="0"/>
+              <a:t>Frequently used classes such as </a:t>
+            </a:r>
+            <a:r>
+              <a:rPr lang="en-US" sz="1000" dirty="0" err="1">
+                <a:latin typeface="Lucida Console" panose="020B0609040504020204" pitchFamily="49" charset="0"/>
+              </a:rPr>
+              <a:t>java.lang.String</a:t>
+            </a:r>
+            <a:endParaRPr lang="en-US" sz="1000" dirty="0">
+              <a:latin typeface="Lucida Console" panose="020B0609040504020204" pitchFamily="49" charset="0"/>
+            </a:endParaRPr>
+          </a:p>
+          <a:p>
+            <a:pPr lvl="4">
+              <a:buFont typeface="Wingdings" panose="05000000000000000000" pitchFamily="2" charset="2"/>
+              <a:buChar char="§"/>
+            </a:pPr>
+            <a:r>
+              <a:rPr lang="en-US" dirty="0"/>
+              <a:t>Using command line option </a:t>
+            </a:r>
+            <a:r>
+              <a:rPr lang="en-US" sz="1000" dirty="0">
+                <a:latin typeface="Lucida Console" panose="020B0609040504020204" pitchFamily="49" charset="0"/>
+              </a:rPr>
+              <a:t>--initialize-at-build-time=&lt;class&gt;</a:t>
+            </a:r>
+          </a:p>
+          <a:p>
+            <a:pPr lvl="4">
+              <a:buFont typeface="Wingdings" panose="05000000000000000000" pitchFamily="2" charset="2"/>
+              <a:buChar char="§"/>
+            </a:pPr>
+            <a:r>
+              <a:rPr lang="en-US" dirty="0"/>
+              <a:t>From a configuration file</a:t>
+            </a:r>
+          </a:p>
+          <a:p>
+            <a:pPr lvl="3">
+              <a:buFont typeface="Wingdings" panose="05000000000000000000" pitchFamily="2" charset="2"/>
+              <a:buChar char="Ø"/>
+            </a:pPr>
+            <a:r>
+              <a:rPr lang="en-US" dirty="0"/>
+              <a:t>Static Analysis</a:t>
+            </a:r>
+          </a:p>
+          <a:p>
+            <a:pPr lvl="4">
+              <a:buFont typeface="Wingdings" panose="05000000000000000000" pitchFamily="2" charset="2"/>
+              <a:buChar char="§"/>
+            </a:pPr>
+            <a:r>
+              <a:rPr lang="en-US" dirty="0"/>
+              <a:t>Class bytecode scanned for reachable code</a:t>
+            </a:r>
+          </a:p>
+          <a:p>
+            <a:pPr lvl="4">
+              <a:buFont typeface="Wingdings" panose="05000000000000000000" pitchFamily="2" charset="2"/>
+              <a:buChar char="§"/>
+            </a:pPr>
+            <a:r>
+              <a:rPr lang="en-US" dirty="0"/>
+              <a:t>Method bytecode scanned for reachable elements</a:t>
+            </a:r>
+          </a:p>
+          <a:p>
+            <a:pPr lvl="4">
+              <a:buFont typeface="Wingdings" panose="05000000000000000000" pitchFamily="2" charset="2"/>
+              <a:buChar char="§"/>
+            </a:pPr>
+            <a:r>
+              <a:rPr lang="en-US" dirty="0"/>
+              <a:t>Discovered elements scanned iteratively</a:t>
+            </a:r>
+          </a:p>
+          <a:p>
+            <a:pPr lvl="4">
+              <a:buFont typeface="Wingdings" panose="05000000000000000000" pitchFamily="2" charset="2"/>
+              <a:buChar char="§"/>
+            </a:pPr>
+            <a:r>
+              <a:rPr lang="en-US" dirty="0"/>
+              <a:t>Only reachable elements are included in the final image</a:t>
+            </a:r>
+          </a:p>
+          <a:p>
+            <a:pPr lvl="2">
+              <a:buFont typeface="Wingdings" panose="05000000000000000000" pitchFamily="2" charset="2"/>
+              <a:buChar char="§"/>
+            </a:pPr>
+            <a:endParaRPr lang="en-US" dirty="0"/>
+          </a:p>
+        </p:txBody>
+      </p:sp>
+    </p:spTree>
+    <p:extLst>
+      <p:ext uri="{BB962C8B-B14F-4D97-AF65-F5344CB8AC3E}">
+        <p14:creationId xmlns:p14="http://schemas.microsoft.com/office/powerpoint/2010/main" val="3454209268"/>
+      </p:ext>
+    </p:extLst>
+  </p:cSld>
+  <p:clrMapOvr>
+    <a:masterClrMapping/>
+  </p:clrMapOvr>
+</p:sld>
+</file>
+
+<file path=ppt/slides/slide24.xml><?xml version="1.0" encoding="utf-8"?>
+<p:sld xmlns:a="http://schemas.openxmlformats.org/drawingml/2006/main" xmlns:r="http://schemas.openxmlformats.org/officeDocument/2006/relationships" xmlns:p="http://schemas.openxmlformats.org/presentationml/2006/main">
+  <p:cSld>
+    <p:spTree>
+      <p:nvGrpSpPr>
+        <p:cNvPr id="1" name=""/>
+        <p:cNvGrpSpPr/>
+        <p:nvPr/>
+      </p:nvGrpSpPr>
+      <p:grpSpPr>
+        <a:xfrm>
+          <a:off x="0" y="0"/>
+          <a:ext cx="0" cy="0"/>
+          <a:chOff x="0" y="0"/>
+          <a:chExt cx="0" cy="0"/>
+        </a:xfrm>
+      </p:grpSpPr>
+      <p:sp>
+        <p:nvSpPr>
+          <p:cNvPr id="2" name="Title 1"/>
+          <p:cNvSpPr>
+            <a:spLocks noGrp="1"/>
+          </p:cNvSpPr>
+          <p:nvPr>
+            <p:ph type="title"/>
+          </p:nvPr>
+        </p:nvSpPr>
+        <p:spPr>
+          <a:xfrm>
+            <a:off x="646111" y="452718"/>
+            <a:ext cx="9404723" cy="910569"/>
+          </a:xfrm>
+        </p:spPr>
+        <p:txBody>
+          <a:bodyPr/>
+          <a:lstStyle/>
+          <a:p>
+            <a:r>
+              <a:rPr lang="en-US" dirty="0"/>
+              <a:t>Native Image Conversion </a:t>
+            </a:r>
+            <a:r>
+              <a:rPr lang="en-US" sz="1800" dirty="0"/>
+              <a:t>(</a:t>
+            </a:r>
+            <a:r>
+              <a:rPr lang="en-US" sz="1800" dirty="0" err="1"/>
+              <a:t>Cont</a:t>
+            </a:r>
+            <a:r>
+              <a:rPr lang="en-US" sz="1800" dirty="0"/>
+              <a:t>)</a:t>
+            </a:r>
+          </a:p>
+        </p:txBody>
+      </p:sp>
+      <p:sp>
+        <p:nvSpPr>
+          <p:cNvPr id="3" name="Content Placeholder 2"/>
+          <p:cNvSpPr>
+            <a:spLocks noGrp="1"/>
+          </p:cNvSpPr>
+          <p:nvPr>
+            <p:ph idx="1"/>
+          </p:nvPr>
+        </p:nvSpPr>
+        <p:spPr>
+          <a:xfrm>
+            <a:off x="646111" y="1363287"/>
+            <a:ext cx="9403743" cy="5120639"/>
+          </a:xfrm>
+        </p:spPr>
+        <p:txBody>
+          <a:bodyPr>
+            <a:normAutofit fontScale="92500" lnSpcReduction="10000"/>
+          </a:bodyPr>
+          <a:lstStyle/>
+          <a:p>
+            <a:r>
+              <a:rPr lang="en-US" dirty="0"/>
+              <a:t>Detailed Build Process</a:t>
+            </a:r>
+          </a:p>
+          <a:p>
+            <a:pPr lvl="1">
+              <a:buFont typeface="Wingdings" panose="05000000000000000000" pitchFamily="2" charset="2"/>
+              <a:buChar char="Ø"/>
+            </a:pPr>
+            <a:r>
+              <a:rPr lang="en-US" dirty="0"/>
+              <a:t>Prerequisites</a:t>
+            </a:r>
+          </a:p>
+          <a:p>
+            <a:pPr lvl="2">
+              <a:buFont typeface="Wingdings" panose="05000000000000000000" pitchFamily="2" charset="2"/>
+              <a:buChar char="Ø"/>
+            </a:pPr>
+            <a:r>
+              <a:rPr lang="en-US" dirty="0"/>
+              <a:t>Start with a known stable Java 17 release of app to be built</a:t>
+            </a:r>
+          </a:p>
+          <a:p>
+            <a:pPr lvl="2">
+              <a:buFont typeface="Wingdings" panose="05000000000000000000" pitchFamily="2" charset="2"/>
+              <a:buChar char="Ø"/>
+            </a:pPr>
+            <a:r>
+              <a:rPr lang="en-US" dirty="0"/>
+              <a:t>GraalVM compiler version 22.2.r17 (</a:t>
+            </a:r>
+            <a:r>
+              <a:rPr lang="en-US" dirty="0" err="1"/>
+              <a:t>sdkman</a:t>
+            </a:r>
+            <a:r>
+              <a:rPr lang="en-US" dirty="0"/>
+              <a:t> 22.2.r17-grl)</a:t>
+            </a:r>
+          </a:p>
+          <a:p>
+            <a:pPr lvl="2">
+              <a:buFont typeface="Wingdings" panose="05000000000000000000" pitchFamily="2" charset="2"/>
+              <a:buChar char="Ø"/>
+            </a:pPr>
+            <a:r>
+              <a:rPr lang="en-US" dirty="0" err="1"/>
+              <a:t>Graal</a:t>
+            </a:r>
+            <a:r>
+              <a:rPr lang="en-US" dirty="0"/>
+              <a:t> Updater (for tracing agent) installed</a:t>
+            </a:r>
+          </a:p>
+          <a:p>
+            <a:pPr lvl="2">
+              <a:buFont typeface="Wingdings" panose="05000000000000000000" pitchFamily="2" charset="2"/>
+              <a:buChar char="Ø"/>
+            </a:pPr>
+            <a:r>
+              <a:rPr lang="en-US" dirty="0"/>
+              <a:t>IDE with debugger support (optional, but very helpful)</a:t>
+            </a:r>
+          </a:p>
+          <a:p>
+            <a:pPr lvl="1">
+              <a:buFont typeface="Wingdings" panose="05000000000000000000" pitchFamily="2" charset="2"/>
+              <a:buChar char="Ø"/>
+            </a:pPr>
+            <a:r>
+              <a:rPr lang="en-US" dirty="0"/>
+              <a:t>Step 1 – Starting point, test compile and run</a:t>
+            </a:r>
+          </a:p>
+          <a:p>
+            <a:pPr lvl="2">
+              <a:buFont typeface="Wingdings" panose="05000000000000000000" pitchFamily="2" charset="2"/>
+              <a:buChar char="Ø"/>
+            </a:pPr>
+            <a:r>
+              <a:rPr lang="en-US" dirty="0"/>
+              <a:t>Example basic build command for Qpid</a:t>
+            </a:r>
+          </a:p>
+          <a:p>
+            <a:pPr lvl="3">
+              <a:buFont typeface="Wingdings" panose="05000000000000000000" pitchFamily="2" charset="2"/>
+              <a:buChar char="Ø"/>
+            </a:pPr>
+            <a:r>
+              <a:rPr lang="en-US" dirty="0">
+                <a:latin typeface="Lucida Console" panose="020B0609040504020204" pitchFamily="49" charset="0"/>
+              </a:rPr>
+              <a:t>native-image --no-fallback </a:t>
+            </a:r>
+            <a:r>
+              <a:rPr lang="en-US" dirty="0">
+                <a:solidFill>
+                  <a:srgbClr val="000000"/>
+                </a:solidFill>
+                <a:latin typeface="Lucida Console" panose="020B0609040504020204" pitchFamily="49" charset="0"/>
+              </a:rPr>
+              <a:t>-J-XX:MaxDirectMemorySize=1536m -J-server -</a:t>
+            </a:r>
+            <a:r>
+              <a:rPr lang="en-US" dirty="0" err="1">
+                <a:solidFill>
+                  <a:srgbClr val="000000"/>
+                </a:solidFill>
+                <a:latin typeface="Lucida Console" panose="020B0609040504020204" pitchFamily="49" charset="0"/>
+              </a:rPr>
+              <a:t>Dpolyglot.js.nashorn-compat</a:t>
+            </a:r>
+            <a:r>
+              <a:rPr lang="en-US" dirty="0">
+                <a:solidFill>
+                  <a:srgbClr val="000000"/>
+                </a:solidFill>
+                <a:latin typeface="Lucida Console" panose="020B0609040504020204" pitchFamily="49" charset="0"/>
+              </a:rPr>
+              <a:t>=true -DPNAME=QPBRKR -DQPID_HOME=/</a:t>
+            </a:r>
+            <a:r>
+              <a:rPr lang="en-US" dirty="0" err="1">
+                <a:solidFill>
+                  <a:srgbClr val="000000"/>
+                </a:solidFill>
+                <a:latin typeface="Lucida Console" panose="020B0609040504020204" pitchFamily="49" charset="0"/>
+              </a:rPr>
+              <a:t>usr</a:t>
+            </a:r>
+            <a:r>
+              <a:rPr lang="en-US" dirty="0">
+                <a:solidFill>
+                  <a:srgbClr val="000000"/>
+                </a:solidFill>
+                <a:latin typeface="Lucida Console" panose="020B0609040504020204" pitchFamily="49" charset="0"/>
+              </a:rPr>
+              <a:t>/local/</a:t>
+            </a:r>
+            <a:r>
+              <a:rPr lang="en-US" dirty="0" err="1">
+                <a:solidFill>
+                  <a:srgbClr val="000000"/>
+                </a:solidFill>
+                <a:latin typeface="Lucida Console" panose="020B0609040504020204" pitchFamily="49" charset="0"/>
+              </a:rPr>
+              <a:t>src</a:t>
+            </a:r>
+            <a:r>
+              <a:rPr lang="en-US" dirty="0">
+                <a:solidFill>
+                  <a:srgbClr val="000000"/>
+                </a:solidFill>
+                <a:latin typeface="Lucida Console" panose="020B0609040504020204" pitchFamily="49" charset="0"/>
+              </a:rPr>
+              <a:t>/</a:t>
+            </a:r>
+            <a:r>
+              <a:rPr lang="en-US" dirty="0" err="1">
+                <a:solidFill>
+                  <a:srgbClr val="000000"/>
+                </a:solidFill>
+                <a:latin typeface="Lucida Console" panose="020B0609040504020204" pitchFamily="49" charset="0"/>
+              </a:rPr>
+              <a:t>qpid</a:t>
+            </a:r>
+            <a:r>
+              <a:rPr lang="en-US" dirty="0">
+                <a:solidFill>
+                  <a:srgbClr val="000000"/>
+                </a:solidFill>
+                <a:latin typeface="Lucida Console" panose="020B0609040504020204" pitchFamily="49" charset="0"/>
+              </a:rPr>
+              <a:t>/Qpid4Graal/native/</a:t>
+            </a:r>
+            <a:r>
+              <a:rPr lang="en-US" dirty="0" err="1">
+                <a:solidFill>
+                  <a:srgbClr val="000000"/>
+                </a:solidFill>
+                <a:latin typeface="Lucida Console" panose="020B0609040504020204" pitchFamily="49" charset="0"/>
+              </a:rPr>
+              <a:t>qpid</a:t>
+            </a:r>
+            <a:r>
+              <a:rPr lang="en-US" dirty="0">
+                <a:solidFill>
+                  <a:srgbClr val="000000"/>
+                </a:solidFill>
+                <a:latin typeface="Lucida Console" panose="020B0609040504020204" pitchFamily="49" charset="0"/>
+              </a:rPr>
+              <a:t>-broker/8.0.6 -DQPID_WORK=/var/</a:t>
+            </a:r>
+            <a:r>
+              <a:rPr lang="en-US" dirty="0" err="1">
+                <a:solidFill>
+                  <a:srgbClr val="000000"/>
+                </a:solidFill>
+                <a:latin typeface="Lucida Console" panose="020B0609040504020204" pitchFamily="49" charset="0"/>
+              </a:rPr>
+              <a:t>qpidwork</a:t>
+            </a:r>
+            <a:r>
+              <a:rPr lang="en-US" dirty="0">
+                <a:solidFill>
+                  <a:srgbClr val="000000"/>
+                </a:solidFill>
+                <a:latin typeface="Lucida Console" panose="020B0609040504020204" pitchFamily="49" charset="0"/>
+              </a:rPr>
+              <a:t> -jar qpid-broker-8.0.6.jar </a:t>
+            </a:r>
+            <a:r>
+              <a:rPr lang="en-US" dirty="0" err="1">
+                <a:solidFill>
+                  <a:srgbClr val="000000"/>
+                </a:solidFill>
+                <a:latin typeface="Lucida Console" panose="020B0609040504020204" pitchFamily="49" charset="0"/>
+              </a:rPr>
+              <a:t>qpid</a:t>
+            </a:r>
+            <a:endParaRPr lang="en-US" dirty="0">
+              <a:solidFill>
+                <a:srgbClr val="000000"/>
+              </a:solidFill>
+              <a:latin typeface="Lucida Console" panose="020B0609040504020204" pitchFamily="49" charset="0"/>
+            </a:endParaRPr>
+          </a:p>
+          <a:p>
+            <a:pPr lvl="2">
+              <a:buFont typeface="Wingdings" panose="05000000000000000000" pitchFamily="2" charset="2"/>
+              <a:buChar char="Ø"/>
+            </a:pPr>
+            <a:r>
+              <a:rPr lang="en-US" dirty="0">
+                <a:solidFill>
+                  <a:srgbClr val="000000"/>
+                </a:solidFill>
+              </a:rPr>
+              <a:t>Execute the resulting image</a:t>
+            </a:r>
+          </a:p>
+          <a:p>
+            <a:pPr lvl="3">
+              <a:buFont typeface="Wingdings" panose="05000000000000000000" pitchFamily="2" charset="2"/>
+              <a:buChar char="Ø"/>
+            </a:pPr>
+            <a:r>
+              <a:rPr lang="en-US" dirty="0">
+                <a:solidFill>
+                  <a:srgbClr val="000000"/>
+                </a:solidFill>
+                <a:latin typeface="Lucida Console" panose="020B0609040504020204" pitchFamily="49" charset="0"/>
+              </a:rPr>
+              <a:t>./</a:t>
+            </a:r>
+            <a:r>
+              <a:rPr lang="en-US" dirty="0" err="1">
+                <a:solidFill>
+                  <a:srgbClr val="000000"/>
+                </a:solidFill>
+                <a:latin typeface="Lucida Console" panose="020B0609040504020204" pitchFamily="49" charset="0"/>
+              </a:rPr>
+              <a:t>qpid</a:t>
+            </a:r>
+            <a:r>
+              <a:rPr lang="en-US" dirty="0">
+                <a:solidFill>
+                  <a:srgbClr val="000000"/>
+                </a:solidFill>
+                <a:latin typeface="Lucida Console" panose="020B0609040504020204" pitchFamily="49" charset="0"/>
+              </a:rPr>
+              <a:t> –DPNAME=QPBRKR –DQPID_HOME=/var/local/</a:t>
+            </a:r>
+            <a:r>
+              <a:rPr lang="en-US" dirty="0" err="1">
+                <a:solidFill>
+                  <a:srgbClr val="000000"/>
+                </a:solidFill>
+                <a:latin typeface="Lucida Console" panose="020B0609040504020204" pitchFamily="49" charset="0"/>
+              </a:rPr>
+              <a:t>qpid</a:t>
+            </a:r>
+            <a:r>
+              <a:rPr lang="en-US" dirty="0">
+                <a:solidFill>
+                  <a:srgbClr val="000000"/>
+                </a:solidFill>
+                <a:latin typeface="Lucida Console" panose="020B0609040504020204" pitchFamily="49" charset="0"/>
+              </a:rPr>
+              <a:t> –DQPID_WORK=/var/</a:t>
+            </a:r>
+            <a:r>
+              <a:rPr lang="en-US" dirty="0" err="1">
+                <a:solidFill>
+                  <a:srgbClr val="000000"/>
+                </a:solidFill>
+                <a:latin typeface="Lucida Console" panose="020B0609040504020204" pitchFamily="49" charset="0"/>
+              </a:rPr>
+              <a:t>qpidwork</a:t>
+            </a:r>
+            <a:r>
+              <a:rPr lang="en-US" dirty="0">
+                <a:solidFill>
+                  <a:srgbClr val="000000"/>
+                </a:solidFill>
+                <a:latin typeface="Lucida Console" panose="020B0609040504020204" pitchFamily="49" charset="0"/>
+              </a:rPr>
+              <a:t> –</a:t>
+            </a:r>
+            <a:r>
+              <a:rPr lang="en-US" dirty="0" err="1">
+                <a:solidFill>
+                  <a:srgbClr val="000000"/>
+                </a:solidFill>
+                <a:latin typeface="Lucida Console" panose="020B0609040504020204" pitchFamily="49" charset="0"/>
+              </a:rPr>
+              <a:t>st</a:t>
+            </a:r>
+            <a:r>
+              <a:rPr lang="en-US" dirty="0">
+                <a:solidFill>
+                  <a:srgbClr val="000000"/>
+                </a:solidFill>
+                <a:latin typeface="Lucida Console" panose="020B0609040504020204" pitchFamily="49" charset="0"/>
+              </a:rPr>
+              <a:t> JSON</a:t>
+            </a:r>
+          </a:p>
+          <a:p>
+            <a:pPr lvl="2">
+              <a:buFont typeface="Wingdings" panose="05000000000000000000" pitchFamily="2" charset="2"/>
+              <a:buChar char="Ø"/>
+            </a:pPr>
+            <a:r>
+              <a:rPr lang="en-US" dirty="0">
+                <a:solidFill>
+                  <a:srgbClr val="000000"/>
+                </a:solidFill>
+              </a:rPr>
+              <a:t>On failure, valuable insight is provided</a:t>
+            </a:r>
+          </a:p>
+          <a:p>
+            <a:pPr lvl="3">
+              <a:buFont typeface="Wingdings" panose="05000000000000000000" pitchFamily="2" charset="2"/>
+              <a:buChar char="Ø"/>
+            </a:pPr>
+            <a:r>
+              <a:rPr lang="en-US" dirty="0">
+                <a:solidFill>
+                  <a:srgbClr val="000000"/>
+                </a:solidFill>
+              </a:rPr>
+              <a:t>What command line options are needed</a:t>
+            </a:r>
+          </a:p>
+          <a:p>
+            <a:pPr lvl="3">
+              <a:buFont typeface="Wingdings" panose="05000000000000000000" pitchFamily="2" charset="2"/>
+              <a:buChar char="Ø"/>
+            </a:pPr>
+            <a:r>
+              <a:rPr lang="en-US" dirty="0">
+                <a:solidFill>
+                  <a:srgbClr val="000000"/>
+                </a:solidFill>
+              </a:rPr>
+              <a:t>What issues need to be resolved</a:t>
+            </a:r>
+          </a:p>
+          <a:p>
+            <a:pPr lvl="3">
+              <a:buFont typeface="Wingdings" panose="05000000000000000000" pitchFamily="2" charset="2"/>
+              <a:buChar char="Ø"/>
+            </a:pPr>
+            <a:r>
+              <a:rPr lang="en-US" dirty="0">
+                <a:solidFill>
+                  <a:srgbClr val="000000"/>
+                </a:solidFill>
+              </a:rPr>
+              <a:t>Is it even worth doing</a:t>
+            </a:r>
+          </a:p>
+        </p:txBody>
+      </p:sp>
+    </p:spTree>
+    <p:extLst>
+      <p:ext uri="{BB962C8B-B14F-4D97-AF65-F5344CB8AC3E}">
+        <p14:creationId xmlns:p14="http://schemas.microsoft.com/office/powerpoint/2010/main" val="1101922744"/>
+      </p:ext>
+    </p:extLst>
+  </p:cSld>
+  <p:clrMapOvr>
+    <a:masterClrMapping/>
+  </p:clrMapOvr>
+</p:sld>
+</file>
+
+<file path=ppt/slides/slide25.xml><?xml version="1.0" encoding="utf-8"?>
+<p:sld xmlns:a="http://schemas.openxmlformats.org/drawingml/2006/main" xmlns:r="http://schemas.openxmlformats.org/officeDocument/2006/relationships" xmlns:p="http://schemas.openxmlformats.org/presentationml/2006/main">
+  <p:cSld>
+    <p:spTree>
+      <p:nvGrpSpPr>
+        <p:cNvPr id="1" name=""/>
+        <p:cNvGrpSpPr/>
+        <p:nvPr/>
+      </p:nvGrpSpPr>
+      <p:grpSpPr>
+        <a:xfrm>
+          <a:off x="0" y="0"/>
+          <a:ext cx="0" cy="0"/>
+          <a:chOff x="0" y="0"/>
+          <a:chExt cx="0" cy="0"/>
+        </a:xfrm>
+      </p:grpSpPr>
+      <p:sp>
+        <p:nvSpPr>
+          <p:cNvPr id="2" name="Title 1"/>
+          <p:cNvSpPr>
+            <a:spLocks noGrp="1"/>
+          </p:cNvSpPr>
+          <p:nvPr>
+            <p:ph type="title"/>
+          </p:nvPr>
+        </p:nvSpPr>
+        <p:spPr>
+          <a:xfrm>
+            <a:off x="646111" y="452718"/>
+            <a:ext cx="9404723" cy="910569"/>
+          </a:xfrm>
+        </p:spPr>
+        <p:txBody>
+          <a:bodyPr/>
+          <a:lstStyle/>
+          <a:p>
+            <a:r>
+              <a:rPr lang="en-US" dirty="0"/>
+              <a:t>Native Image Conversion </a:t>
+            </a:r>
+            <a:r>
+              <a:rPr lang="en-US" sz="1800" dirty="0"/>
+              <a:t>(</a:t>
+            </a:r>
+            <a:r>
+              <a:rPr lang="en-US" sz="1800" dirty="0" err="1"/>
+              <a:t>Cont</a:t>
+            </a:r>
+            <a:r>
+              <a:rPr lang="en-US" sz="1800" dirty="0"/>
+              <a:t>)</a:t>
+            </a:r>
+          </a:p>
+        </p:txBody>
+      </p:sp>
+      <p:sp>
+        <p:nvSpPr>
+          <p:cNvPr id="3" name="Content Placeholder 2"/>
+          <p:cNvSpPr>
+            <a:spLocks noGrp="1"/>
+          </p:cNvSpPr>
+          <p:nvPr>
+            <p:ph idx="1"/>
+          </p:nvPr>
+        </p:nvSpPr>
+        <p:spPr>
+          <a:xfrm>
+            <a:off x="646112" y="1363287"/>
+            <a:ext cx="8936196" cy="5120639"/>
+          </a:xfrm>
+        </p:spPr>
+        <p:txBody>
+          <a:bodyPr>
+            <a:normAutofit/>
+          </a:bodyPr>
+          <a:lstStyle/>
+          <a:p>
+            <a:r>
+              <a:rPr lang="en-US" dirty="0"/>
+              <a:t>Detailed Build Process </a:t>
+            </a:r>
+            <a:r>
+              <a:rPr lang="en-US" sz="1100" dirty="0"/>
+              <a:t>(</a:t>
+            </a:r>
+            <a:r>
+              <a:rPr lang="en-US" sz="1100" dirty="0" err="1"/>
+              <a:t>Cont</a:t>
+            </a:r>
+            <a:r>
+              <a:rPr lang="en-US" sz="1100" dirty="0"/>
+              <a:t>)</a:t>
+            </a:r>
+          </a:p>
+          <a:p>
+            <a:pPr lvl="1">
+              <a:buFont typeface="Wingdings" panose="05000000000000000000" pitchFamily="2" charset="2"/>
+              <a:buChar char="Ø"/>
+            </a:pPr>
+            <a:r>
+              <a:rPr lang="en-US" dirty="0"/>
+              <a:t>Step 2 – Debug and Agent Test</a:t>
+            </a:r>
+          </a:p>
+          <a:p>
+            <a:pPr lvl="2">
+              <a:buFont typeface="Wingdings" panose="05000000000000000000" pitchFamily="2" charset="2"/>
+              <a:buChar char="Ø"/>
+            </a:pPr>
+            <a:r>
+              <a:rPr lang="en-US" dirty="0">
+                <a:solidFill>
+                  <a:srgbClr val="000000"/>
+                </a:solidFill>
+              </a:rPr>
+              <a:t>2a: Debug and address any obvious failures</a:t>
+            </a:r>
+          </a:p>
+          <a:p>
+            <a:pPr lvl="3">
+              <a:buFont typeface="Wingdings" panose="05000000000000000000" pitchFamily="2" charset="2"/>
+              <a:buChar char="Ø"/>
+            </a:pPr>
+            <a:r>
+              <a:rPr lang="en-US" dirty="0">
+                <a:solidFill>
+                  <a:srgbClr val="000000"/>
+                </a:solidFill>
+              </a:rPr>
+              <a:t>Add</a:t>
+            </a:r>
+            <a:r>
+              <a:rPr lang="en-US" dirty="0">
+                <a:solidFill>
+                  <a:srgbClr val="000000"/>
+                </a:solidFill>
+                <a:latin typeface="Lucida Console" panose="020B0609040504020204" pitchFamily="49" charset="0"/>
+              </a:rPr>
+              <a:t> </a:t>
+            </a:r>
+            <a:r>
+              <a:rPr lang="en-US" sz="1100" dirty="0">
+                <a:solidFill>
+                  <a:srgbClr val="000000"/>
+                </a:solidFill>
+                <a:latin typeface="Lucida Console" panose="020B0609040504020204" pitchFamily="49" charset="0"/>
+              </a:rPr>
+              <a:t>native-image </a:t>
+            </a:r>
+            <a:r>
+              <a:rPr lang="en-US" dirty="0">
+                <a:solidFill>
+                  <a:srgbClr val="000000"/>
+                </a:solidFill>
+              </a:rPr>
+              <a:t>command line options as needed</a:t>
+            </a:r>
+          </a:p>
+          <a:p>
+            <a:pPr lvl="4">
+              <a:buFont typeface="Wingdings" panose="05000000000000000000" pitchFamily="2" charset="2"/>
+              <a:buChar char="Ø"/>
+            </a:pPr>
+            <a:r>
+              <a:rPr lang="en-US" dirty="0">
+                <a:solidFill>
+                  <a:srgbClr val="000000"/>
+                </a:solidFill>
+              </a:rPr>
+              <a:t>HTTP Protocol</a:t>
+            </a:r>
+          </a:p>
+          <a:p>
+            <a:pPr lvl="4">
+              <a:buFont typeface="Wingdings" panose="05000000000000000000" pitchFamily="2" charset="2"/>
+              <a:buChar char="Ø"/>
+            </a:pPr>
+            <a:r>
+              <a:rPr lang="en-US" dirty="0">
+                <a:solidFill>
+                  <a:srgbClr val="000000"/>
+                </a:solidFill>
+              </a:rPr>
+              <a:t>HTTPS Protocol</a:t>
+            </a:r>
+          </a:p>
+          <a:p>
+            <a:pPr lvl="4">
+              <a:buFont typeface="Wingdings" panose="05000000000000000000" pitchFamily="2" charset="2"/>
+              <a:buChar char="Ø"/>
+            </a:pPr>
+            <a:r>
+              <a:rPr lang="en-US" dirty="0">
+                <a:solidFill>
+                  <a:srgbClr val="000000"/>
+                </a:solidFill>
+              </a:rPr>
+              <a:t>Signal Handlers</a:t>
+            </a:r>
+          </a:p>
+          <a:p>
+            <a:pPr lvl="3">
+              <a:buFont typeface="Wingdings" panose="05000000000000000000" pitchFamily="2" charset="2"/>
+              <a:buChar char="Ø"/>
+            </a:pPr>
+            <a:r>
+              <a:rPr lang="en-US" dirty="0">
+                <a:solidFill>
+                  <a:srgbClr val="000000"/>
+                </a:solidFill>
+              </a:rPr>
+              <a:t>Correct obvious code issues</a:t>
+            </a:r>
+          </a:p>
+          <a:p>
+            <a:pPr lvl="4">
+              <a:buFont typeface="Wingdings" panose="05000000000000000000" pitchFamily="2" charset="2"/>
+              <a:buChar char="Ø"/>
+            </a:pPr>
+            <a:r>
+              <a:rPr lang="en-US" dirty="0">
+                <a:solidFill>
+                  <a:srgbClr val="000000"/>
+                </a:solidFill>
+              </a:rPr>
+              <a:t>Review the </a:t>
+            </a:r>
+            <a:r>
+              <a:rPr lang="en-US" dirty="0">
+                <a:solidFill>
+                  <a:schemeClr val="accent2"/>
+                </a:solidFill>
+                <a:hlinkClick r:id="rId2">
+                  <a:extLst>
+                    <a:ext uri="{A12FA001-AC4F-418D-AE19-62706E023703}">
+                      <ahyp:hlinkClr xmlns:ahyp="http://schemas.microsoft.com/office/drawing/2018/hyperlinkcolor" val="tx"/>
+                    </a:ext>
+                  </a:extLst>
+                </a:hlinkClick>
+              </a:rPr>
+              <a:t>Native Image Compatibility Guide</a:t>
+            </a:r>
+            <a:endParaRPr lang="en-US" dirty="0">
+              <a:solidFill>
+                <a:schemeClr val="accent2"/>
+              </a:solidFill>
+            </a:endParaRPr>
+          </a:p>
+          <a:p>
+            <a:pPr lvl="4">
+              <a:buFont typeface="Wingdings" panose="05000000000000000000" pitchFamily="2" charset="2"/>
+              <a:buChar char="Ø"/>
+            </a:pPr>
+            <a:r>
+              <a:rPr lang="en-US" dirty="0">
+                <a:solidFill>
+                  <a:schemeClr val="tx1"/>
+                </a:solidFill>
+              </a:rPr>
+              <a:t>Review</a:t>
+            </a:r>
+            <a:r>
+              <a:rPr lang="en-US" dirty="0">
+                <a:solidFill>
+                  <a:schemeClr val="accent2"/>
+                </a:solidFill>
+              </a:rPr>
+              <a:t> </a:t>
+            </a:r>
+            <a:r>
+              <a:rPr lang="en-US" dirty="0">
+                <a:solidFill>
+                  <a:schemeClr val="accent2"/>
+                </a:solidFill>
+                <a:hlinkClick r:id="rId3">
+                  <a:extLst>
+                    <a:ext uri="{A12FA001-AC4F-418D-AE19-62706E023703}">
+                      <ahyp:hlinkClr xmlns:ahyp="http://schemas.microsoft.com/office/drawing/2018/hyperlinkcolor" val="tx"/>
+                    </a:ext>
+                  </a:extLst>
+                </a:hlinkClick>
+              </a:rPr>
+              <a:t>Spring Native Image Documentation</a:t>
+            </a:r>
+            <a:endParaRPr lang="en-US" dirty="0">
+              <a:solidFill>
+                <a:schemeClr val="accent2"/>
+              </a:solidFill>
+            </a:endParaRPr>
+          </a:p>
+          <a:p>
+            <a:pPr lvl="3">
+              <a:buFont typeface="Wingdings" panose="05000000000000000000" pitchFamily="2" charset="2"/>
+              <a:buChar char="Ø"/>
+            </a:pPr>
+            <a:r>
+              <a:rPr lang="en-US" dirty="0">
+                <a:solidFill>
+                  <a:srgbClr val="000000"/>
+                </a:solidFill>
+              </a:rPr>
+              <a:t>Add missing resources to the build/image path</a:t>
+            </a:r>
+          </a:p>
+          <a:p>
+            <a:pPr lvl="4">
+              <a:buFont typeface="Wingdings" panose="05000000000000000000" pitchFamily="2" charset="2"/>
+              <a:buChar char="Ø"/>
+            </a:pPr>
+            <a:r>
+              <a:rPr lang="en-US" dirty="0">
+                <a:solidFill>
+                  <a:srgbClr val="000000"/>
+                </a:solidFill>
+              </a:rPr>
+              <a:t>Database driver(s)</a:t>
+            </a:r>
+          </a:p>
+          <a:p>
+            <a:pPr lvl="4">
+              <a:buFont typeface="Wingdings" panose="05000000000000000000" pitchFamily="2" charset="2"/>
+              <a:buChar char="Ø"/>
+            </a:pPr>
+            <a:r>
+              <a:rPr lang="en-US" dirty="0">
+                <a:solidFill>
+                  <a:srgbClr val="000000"/>
+                </a:solidFill>
+              </a:rPr>
+              <a:t>Locale bundle(s)</a:t>
+            </a:r>
+          </a:p>
+          <a:p>
+            <a:pPr lvl="4">
+              <a:buFont typeface="Wingdings" panose="05000000000000000000" pitchFamily="2" charset="2"/>
+              <a:buChar char="Ø"/>
+            </a:pPr>
+            <a:r>
+              <a:rPr lang="en-US" dirty="0">
+                <a:solidFill>
+                  <a:srgbClr val="000000"/>
+                </a:solidFill>
+              </a:rPr>
+              <a:t>Property files</a:t>
+            </a:r>
+          </a:p>
+          <a:p>
+            <a:pPr lvl="4">
+              <a:buFont typeface="Wingdings" panose="05000000000000000000" pitchFamily="2" charset="2"/>
+              <a:buChar char="Ø"/>
+            </a:pPr>
+            <a:r>
+              <a:rPr lang="en-US" dirty="0">
+                <a:solidFill>
+                  <a:srgbClr val="000000"/>
+                </a:solidFill>
+              </a:rPr>
+              <a:t>Manifest file (Main class)</a:t>
+            </a:r>
+          </a:p>
+          <a:p>
+            <a:pPr lvl="2">
+              <a:buFont typeface="Wingdings" panose="05000000000000000000" pitchFamily="2" charset="2"/>
+              <a:buChar char="Ø"/>
+            </a:pPr>
+            <a:endParaRPr lang="en-US" dirty="0">
+              <a:solidFill>
+                <a:srgbClr val="000000"/>
+              </a:solidFill>
+            </a:endParaRPr>
+          </a:p>
+        </p:txBody>
+      </p:sp>
+    </p:spTree>
+    <p:extLst>
+      <p:ext uri="{BB962C8B-B14F-4D97-AF65-F5344CB8AC3E}">
+        <p14:creationId xmlns:p14="http://schemas.microsoft.com/office/powerpoint/2010/main" val="3738767005"/>
+      </p:ext>
+    </p:extLst>
+  </p:cSld>
+  <p:clrMapOvr>
+    <a:masterClrMapping/>
+  </p:clrMapOvr>
+</p:sld>
+</file>
+
+<file path=ppt/slides/slide26.xml><?xml version="1.0" encoding="utf-8"?>
+<p:sld xmlns:a="http://schemas.openxmlformats.org/drawingml/2006/main" xmlns:r="http://schemas.openxmlformats.org/officeDocument/2006/relationships" xmlns:p="http://schemas.openxmlformats.org/presentationml/2006/main">
+  <p:cSld>
+    <p:spTree>
+      <p:nvGrpSpPr>
+        <p:cNvPr id="1" name=""/>
+        <p:cNvGrpSpPr/>
+        <p:nvPr/>
+      </p:nvGrpSpPr>
+      <p:grpSpPr>
+        <a:xfrm>
+          <a:off x="0" y="0"/>
+          <a:ext cx="0" cy="0"/>
+          <a:chOff x="0" y="0"/>
+          <a:chExt cx="0" cy="0"/>
+        </a:xfrm>
+      </p:grpSpPr>
+      <p:sp>
+        <p:nvSpPr>
+          <p:cNvPr id="2" name="Title 1"/>
+          <p:cNvSpPr>
+            <a:spLocks noGrp="1"/>
+          </p:cNvSpPr>
+          <p:nvPr>
+            <p:ph type="title"/>
+          </p:nvPr>
+        </p:nvSpPr>
+        <p:spPr>
+          <a:xfrm>
+            <a:off x="646111" y="452718"/>
+            <a:ext cx="9404723" cy="910569"/>
+          </a:xfrm>
+        </p:spPr>
+        <p:txBody>
+          <a:bodyPr/>
+          <a:lstStyle/>
+          <a:p>
+            <a:r>
+              <a:rPr lang="en-US" dirty="0"/>
+              <a:t>Native Image Conversion </a:t>
+            </a:r>
+            <a:r>
+              <a:rPr lang="en-US" sz="1800" dirty="0"/>
+              <a:t>(</a:t>
+            </a:r>
+            <a:r>
+              <a:rPr lang="en-US" sz="1800" dirty="0" err="1"/>
+              <a:t>Cont</a:t>
+            </a:r>
+            <a:r>
+              <a:rPr lang="en-US" sz="1800" dirty="0"/>
+              <a:t>)</a:t>
+            </a:r>
+          </a:p>
+        </p:txBody>
+      </p:sp>
+      <p:sp>
+        <p:nvSpPr>
+          <p:cNvPr id="3" name="Content Placeholder 2"/>
+          <p:cNvSpPr>
+            <a:spLocks noGrp="1"/>
+          </p:cNvSpPr>
+          <p:nvPr>
+            <p:ph idx="1"/>
+          </p:nvPr>
+        </p:nvSpPr>
+        <p:spPr>
+          <a:xfrm>
+            <a:off x="646111" y="1363287"/>
+            <a:ext cx="9403743" cy="5120639"/>
+          </a:xfrm>
+        </p:spPr>
+        <p:txBody>
+          <a:bodyPr>
+            <a:normAutofit lnSpcReduction="10000"/>
+          </a:bodyPr>
+          <a:lstStyle/>
+          <a:p>
+            <a:r>
+              <a:rPr lang="en-US" dirty="0"/>
+              <a:t>Detailed Build Process </a:t>
+            </a:r>
+            <a:r>
+              <a:rPr lang="en-US" sz="1100" dirty="0"/>
+              <a:t>(</a:t>
+            </a:r>
+            <a:r>
+              <a:rPr lang="en-US" sz="1100" dirty="0" err="1"/>
+              <a:t>Cont</a:t>
+            </a:r>
+            <a:r>
+              <a:rPr lang="en-US" sz="1100" dirty="0"/>
+              <a:t>)</a:t>
+            </a:r>
+          </a:p>
+          <a:p>
+            <a:pPr lvl="1">
+              <a:buFont typeface="Wingdings" panose="05000000000000000000" pitchFamily="2" charset="2"/>
+              <a:buChar char="Ø"/>
+            </a:pPr>
+            <a:r>
+              <a:rPr lang="en-US" dirty="0"/>
+              <a:t>Step 2 – Debug and Agent Test</a:t>
+            </a:r>
+          </a:p>
+          <a:p>
+            <a:pPr lvl="2">
+              <a:buFont typeface="Wingdings" panose="05000000000000000000" pitchFamily="2" charset="2"/>
+              <a:buChar char="Ø"/>
+            </a:pPr>
+            <a:r>
+              <a:rPr lang="en-US" dirty="0"/>
+              <a:t>2b: Run the Tracing Agent</a:t>
+            </a:r>
+          </a:p>
+          <a:p>
+            <a:pPr lvl="3">
+              <a:buFont typeface="Wingdings" panose="05000000000000000000" pitchFamily="2" charset="2"/>
+              <a:buChar char="Ø"/>
+            </a:pPr>
+            <a:r>
+              <a:rPr lang="en-US" dirty="0"/>
+              <a:t>Purpose</a:t>
+            </a:r>
+          </a:p>
+          <a:p>
+            <a:pPr lvl="4">
+              <a:buFont typeface="Wingdings" panose="05000000000000000000" pitchFamily="2" charset="2"/>
+              <a:buChar char="Ø"/>
+            </a:pPr>
+            <a:r>
+              <a:rPr lang="en-US" dirty="0">
+                <a:solidFill>
+                  <a:srgbClr val="000000"/>
+                </a:solidFill>
+              </a:rPr>
+              <a:t>Tracks resources and classes used at run time</a:t>
+            </a:r>
+          </a:p>
+          <a:p>
+            <a:pPr lvl="4">
+              <a:buFont typeface="Wingdings" panose="05000000000000000000" pitchFamily="2" charset="2"/>
+              <a:buChar char="Ø"/>
+            </a:pPr>
+            <a:r>
+              <a:rPr lang="en-US" dirty="0">
+                <a:solidFill>
+                  <a:srgbClr val="000000"/>
+                </a:solidFill>
+              </a:rPr>
+              <a:t>Creates/updates configuration files as needed for build time</a:t>
+            </a:r>
+          </a:p>
+          <a:p>
+            <a:pPr lvl="4">
+              <a:buFont typeface="Wingdings" panose="05000000000000000000" pitchFamily="2" charset="2"/>
+              <a:buChar char="Ø"/>
+            </a:pPr>
+            <a:r>
+              <a:rPr lang="en-US" dirty="0">
+                <a:solidFill>
+                  <a:srgbClr val="000000"/>
+                </a:solidFill>
+              </a:rPr>
+              <a:t>Requires Java run-time testing</a:t>
+            </a:r>
+          </a:p>
+          <a:p>
+            <a:pPr lvl="3">
+              <a:buFont typeface="Wingdings" panose="05000000000000000000" pitchFamily="2" charset="2"/>
+              <a:buChar char="Ø"/>
+            </a:pPr>
+            <a:r>
+              <a:rPr lang="en-US" dirty="0">
+                <a:solidFill>
+                  <a:srgbClr val="000000"/>
+                </a:solidFill>
+              </a:rPr>
+              <a:t>Install the tracing agent using the </a:t>
+            </a:r>
+            <a:r>
+              <a:rPr lang="en-US" dirty="0">
+                <a:solidFill>
+                  <a:schemeClr val="accent2"/>
+                </a:solidFill>
+                <a:hlinkClick r:id="rId2">
+                  <a:extLst>
+                    <a:ext uri="{A12FA001-AC4F-418D-AE19-62706E023703}">
+                      <ahyp:hlinkClr xmlns:ahyp="http://schemas.microsoft.com/office/drawing/2018/hyperlinkcolor" val="tx"/>
+                    </a:ext>
+                  </a:extLst>
+                </a:hlinkClick>
+              </a:rPr>
+              <a:t>GraalVM Updater</a:t>
+            </a:r>
+            <a:endParaRPr lang="en-US" dirty="0">
+              <a:solidFill>
+                <a:schemeClr val="accent2"/>
+              </a:solidFill>
+            </a:endParaRPr>
+          </a:p>
+          <a:p>
+            <a:pPr lvl="3">
+              <a:buFont typeface="Wingdings" panose="05000000000000000000" pitchFamily="2" charset="2"/>
+              <a:buChar char="Ø"/>
+            </a:pPr>
+            <a:r>
+              <a:rPr lang="en-US" dirty="0">
+                <a:solidFill>
+                  <a:srgbClr val="000000"/>
+                </a:solidFill>
+              </a:rPr>
+              <a:t>Run the Java application with the tracing agent:</a:t>
+            </a:r>
+          </a:p>
+          <a:p>
+            <a:pPr lvl="4">
+              <a:buFont typeface="Wingdings" panose="05000000000000000000" pitchFamily="2" charset="2"/>
+              <a:buChar char="Ø"/>
+            </a:pPr>
+            <a:r>
+              <a:rPr lang="en-US" dirty="0">
+                <a:solidFill>
+                  <a:schemeClr val="tx1"/>
+                </a:solidFill>
+              </a:rPr>
+              <a:t>Via command line:</a:t>
+            </a:r>
+          </a:p>
+          <a:p>
+            <a:pPr lvl="5">
+              <a:buFont typeface="Wingdings" panose="05000000000000000000" pitchFamily="2" charset="2"/>
+              <a:buChar char="Ø"/>
+            </a:pPr>
+            <a:r>
+              <a:rPr lang="en-US" sz="1100" dirty="0">
+                <a:latin typeface="Lucida Console" panose="020B0609040504020204" pitchFamily="49" charset="0"/>
+              </a:rPr>
+              <a:t>java -</a:t>
+            </a:r>
+            <a:r>
+              <a:rPr lang="en-US" sz="1100" dirty="0" err="1">
+                <a:latin typeface="Lucida Console" panose="020B0609040504020204" pitchFamily="49" charset="0"/>
+              </a:rPr>
+              <a:t>agentlib:native-image-agent</a:t>
+            </a:r>
+            <a:r>
+              <a:rPr lang="en-US" sz="1100" dirty="0">
+                <a:latin typeface="Lucida Console" panose="020B0609040504020204" pitchFamily="49" charset="0"/>
+              </a:rPr>
+              <a:t>=config-merge-</a:t>
+            </a:r>
+            <a:r>
+              <a:rPr lang="en-US" sz="1100" dirty="0" err="1">
+                <a:latin typeface="Lucida Console" panose="020B0609040504020204" pitchFamily="49" charset="0"/>
+              </a:rPr>
+              <a:t>dir</a:t>
+            </a:r>
+            <a:r>
+              <a:rPr lang="en-US" sz="1100" dirty="0">
+                <a:latin typeface="Lucida Console" panose="020B0609040504020204" pitchFamily="49" charset="0"/>
+              </a:rPr>
+              <a:t>=${BUILDPATH}/</a:t>
+            </a:r>
+            <a:r>
+              <a:rPr lang="en-US" sz="1100" dirty="0" err="1">
+                <a:latin typeface="Lucida Console" panose="020B0609040504020204" pitchFamily="49" charset="0"/>
+              </a:rPr>
+              <a:t>src</a:t>
+            </a:r>
+            <a:r>
+              <a:rPr lang="en-US" sz="1100" dirty="0">
+                <a:latin typeface="Lucida Console" panose="020B0609040504020204" pitchFamily="49" charset="0"/>
+              </a:rPr>
+              <a:t>/main/resources/META-INF/native-image -server –</a:t>
+            </a:r>
+            <a:r>
+              <a:rPr lang="en-US" sz="1100" dirty="0" err="1">
+                <a:latin typeface="Lucida Console" panose="020B0609040504020204" pitchFamily="49" charset="0"/>
+              </a:rPr>
+              <a:t>classpath</a:t>
+            </a:r>
+            <a:r>
+              <a:rPr lang="en-US" sz="1100" dirty="0">
+                <a:latin typeface="Lucida Console" panose="020B0609040504020204" pitchFamily="49" charset="0"/>
+              </a:rPr>
+              <a:t> &lt;CLASSPATH&gt; -</a:t>
+            </a:r>
+            <a:r>
+              <a:rPr lang="en-US" sz="1100" dirty="0" err="1">
+                <a:latin typeface="Lucida Console" panose="020B0609040504020204" pitchFamily="49" charset="0"/>
+              </a:rPr>
+              <a:t>Dpolyglot.js.nashorn-compat</a:t>
+            </a:r>
+            <a:r>
+              <a:rPr lang="en-US" sz="1100" dirty="0">
+                <a:latin typeface="Lucida Console" panose="020B0609040504020204" pitchFamily="49" charset="0"/>
+              </a:rPr>
+              <a:t>=true -DPNAME=QPBRKR -XX:+</a:t>
+            </a:r>
+            <a:r>
+              <a:rPr lang="en-US" sz="1100" dirty="0" err="1">
+                <a:latin typeface="Lucida Console" panose="020B0609040504020204" pitchFamily="49" charset="0"/>
+              </a:rPr>
+              <a:t>HeapDumpOnOutOfMemoryError</a:t>
+            </a:r>
+            <a:r>
+              <a:rPr lang="en-US" sz="1100" dirty="0">
+                <a:latin typeface="Lucida Console" panose="020B0609040504020204" pitchFamily="49" charset="0"/>
+              </a:rPr>
+              <a:t> -Xmx512m -</a:t>
+            </a:r>
+            <a:r>
+              <a:rPr lang="en-US" sz="1100" dirty="0" err="1">
+                <a:latin typeface="Lucida Console" panose="020B0609040504020204" pitchFamily="49" charset="0"/>
+              </a:rPr>
+              <a:t>XX:MaxDirectMemorySize</a:t>
+            </a:r>
+            <a:r>
+              <a:rPr lang="en-US" sz="1100" dirty="0">
+                <a:latin typeface="Lucida Console" panose="020B0609040504020204" pitchFamily="49" charset="0"/>
+              </a:rPr>
+              <a:t>=1536m -DQPID_HOME=/</a:t>
+            </a:r>
+            <a:r>
+              <a:rPr lang="en-US" sz="1100" dirty="0" err="1">
+                <a:latin typeface="Lucida Console" panose="020B0609040504020204" pitchFamily="49" charset="0"/>
+              </a:rPr>
+              <a:t>usr</a:t>
+            </a:r>
+            <a:r>
+              <a:rPr lang="en-US" sz="1100" dirty="0">
+                <a:latin typeface="Lucida Console" panose="020B0609040504020204" pitchFamily="49" charset="0"/>
+              </a:rPr>
+              <a:t>/local/</a:t>
+            </a:r>
+            <a:r>
+              <a:rPr lang="en-US" sz="1100" dirty="0" err="1">
+                <a:latin typeface="Lucida Console" panose="020B0609040504020204" pitchFamily="49" charset="0"/>
+              </a:rPr>
+              <a:t>src</a:t>
+            </a:r>
+            <a:r>
+              <a:rPr lang="en-US" sz="1100" dirty="0">
+                <a:latin typeface="Lucida Console" panose="020B0609040504020204" pitchFamily="49" charset="0"/>
+              </a:rPr>
+              <a:t>/</a:t>
+            </a:r>
+            <a:r>
+              <a:rPr lang="en-US" sz="1100" dirty="0" err="1">
+                <a:latin typeface="Lucida Console" panose="020B0609040504020204" pitchFamily="49" charset="0"/>
+              </a:rPr>
+              <a:t>qpid</a:t>
+            </a:r>
+            <a:r>
+              <a:rPr lang="en-US" sz="1100" dirty="0">
+                <a:latin typeface="Lucida Console" panose="020B0609040504020204" pitchFamily="49" charset="0"/>
+              </a:rPr>
+              <a:t>/Qpid4Graal/native/</a:t>
+            </a:r>
+            <a:r>
+              <a:rPr lang="en-US" sz="1100" dirty="0" err="1">
+                <a:latin typeface="Lucida Console" panose="020B0609040504020204" pitchFamily="49" charset="0"/>
+              </a:rPr>
+              <a:t>qpid</a:t>
+            </a:r>
+            <a:r>
+              <a:rPr lang="en-US" sz="1100" dirty="0">
+                <a:latin typeface="Lucida Console" panose="020B0609040504020204" pitchFamily="49" charset="0"/>
+              </a:rPr>
+              <a:t>-broker/8.0.6 -DQPID_WORK=/var/</a:t>
+            </a:r>
+            <a:r>
+              <a:rPr lang="en-US" sz="1100" dirty="0" err="1">
+                <a:latin typeface="Lucida Console" panose="020B0609040504020204" pitchFamily="49" charset="0"/>
+              </a:rPr>
+              <a:t>qpidwork</a:t>
+            </a:r>
+            <a:r>
+              <a:rPr lang="en-US" sz="1100" dirty="0">
+                <a:latin typeface="Lucida Console" panose="020B0609040504020204" pitchFamily="49" charset="0"/>
+              </a:rPr>
+              <a:t> </a:t>
+            </a:r>
+            <a:r>
+              <a:rPr lang="en-US" sz="1100" dirty="0" err="1">
+                <a:latin typeface="Lucida Console" panose="020B0609040504020204" pitchFamily="49" charset="0"/>
+              </a:rPr>
+              <a:t>org.apache.qpid.server.Main</a:t>
+            </a:r>
+            <a:r>
+              <a:rPr lang="en-US" sz="1100" dirty="0">
+                <a:latin typeface="Lucida Console" panose="020B0609040504020204" pitchFamily="49" charset="0"/>
+              </a:rPr>
+              <a:t> -</a:t>
+            </a:r>
+            <a:r>
+              <a:rPr lang="en-US" sz="1100" dirty="0" err="1">
+                <a:latin typeface="Lucida Console" panose="020B0609040504020204" pitchFamily="49" charset="0"/>
+              </a:rPr>
+              <a:t>st</a:t>
+            </a:r>
+            <a:r>
+              <a:rPr lang="en-US" sz="1100" dirty="0">
+                <a:latin typeface="Lucida Console" panose="020B0609040504020204" pitchFamily="49" charset="0"/>
+              </a:rPr>
+              <a:t> BDB</a:t>
+            </a:r>
+          </a:p>
+          <a:p>
+            <a:pPr lvl="4">
+              <a:buFont typeface="Wingdings" panose="05000000000000000000" pitchFamily="2" charset="2"/>
+              <a:buChar char="Ø"/>
+            </a:pPr>
+            <a:r>
+              <a:rPr lang="en-US" dirty="0">
+                <a:solidFill>
+                  <a:srgbClr val="000000"/>
+                </a:solidFill>
+              </a:rPr>
+              <a:t>Via environment variable</a:t>
+            </a:r>
+          </a:p>
+          <a:p>
+            <a:pPr lvl="5">
+              <a:buFont typeface="Wingdings" panose="05000000000000000000" pitchFamily="2" charset="2"/>
+              <a:buChar char="Ø"/>
+            </a:pPr>
+            <a:r>
+              <a:rPr lang="en-US" sz="1100" b="0" i="0" dirty="0">
+                <a:solidFill>
+                  <a:schemeClr val="tx1">
+                    <a:lumMod val="95000"/>
+                    <a:lumOff val="5000"/>
+                  </a:schemeClr>
+                </a:solidFill>
+                <a:effectLst/>
+                <a:latin typeface="Lucida Console" panose="020B0609040504020204" pitchFamily="49" charset="0"/>
+              </a:rPr>
+              <a:t>export JAVA_TOOL_OPTIONS="</a:t>
+            </a:r>
+            <a:r>
+              <a:rPr lang="en-US" sz="1100" dirty="0">
+                <a:latin typeface="Lucida Console" panose="020B0609040504020204" pitchFamily="49" charset="0"/>
+              </a:rPr>
+              <a:t>-</a:t>
+            </a:r>
+            <a:r>
+              <a:rPr lang="en-US" sz="1100" dirty="0" err="1">
+                <a:latin typeface="Lucida Console" panose="020B0609040504020204" pitchFamily="49" charset="0"/>
+              </a:rPr>
+              <a:t>agentlib:native-image-agent</a:t>
+            </a:r>
+            <a:r>
+              <a:rPr lang="en-US" sz="1100" dirty="0">
+                <a:latin typeface="Lucida Console" panose="020B0609040504020204" pitchFamily="49" charset="0"/>
+              </a:rPr>
+              <a:t>=config-merge-</a:t>
+            </a:r>
+            <a:r>
+              <a:rPr lang="en-US" sz="1100" dirty="0" err="1">
+                <a:latin typeface="Lucida Console" panose="020B0609040504020204" pitchFamily="49" charset="0"/>
+              </a:rPr>
+              <a:t>dir</a:t>
+            </a:r>
+            <a:r>
+              <a:rPr lang="en-US" sz="1100" dirty="0">
+                <a:latin typeface="Lucida Console" panose="020B0609040504020204" pitchFamily="49" charset="0"/>
+              </a:rPr>
+              <a:t>=${BUILDPATH}/</a:t>
+            </a:r>
+            <a:r>
+              <a:rPr lang="en-US" sz="1100" dirty="0" err="1">
+                <a:latin typeface="Lucida Console" panose="020B0609040504020204" pitchFamily="49" charset="0"/>
+              </a:rPr>
+              <a:t>src</a:t>
+            </a:r>
+            <a:r>
+              <a:rPr lang="en-US" sz="1100" dirty="0">
+                <a:latin typeface="Lucida Console" panose="020B0609040504020204" pitchFamily="49" charset="0"/>
+              </a:rPr>
+              <a:t>/main/resources/META-INF/native-image</a:t>
+            </a:r>
+            <a:r>
+              <a:rPr lang="en-US" sz="1100" b="0" i="0" dirty="0">
+                <a:solidFill>
+                  <a:schemeClr val="tx1">
+                    <a:lumMod val="95000"/>
+                    <a:lumOff val="5000"/>
+                  </a:schemeClr>
+                </a:solidFill>
+                <a:effectLst/>
+                <a:latin typeface="Lucida Console" panose="020B0609040504020204" pitchFamily="49" charset="0"/>
+              </a:rPr>
+              <a:t>"</a:t>
+            </a:r>
+            <a:endParaRPr lang="en-US" sz="1100" dirty="0">
+              <a:solidFill>
+                <a:schemeClr val="tx1">
+                  <a:lumMod val="95000"/>
+                  <a:lumOff val="5000"/>
+                </a:schemeClr>
+              </a:solidFill>
+              <a:latin typeface="Lucida Console" panose="020B0609040504020204" pitchFamily="49" charset="0"/>
+            </a:endParaRPr>
+          </a:p>
+        </p:txBody>
+      </p:sp>
+    </p:spTree>
+    <p:extLst>
+      <p:ext uri="{BB962C8B-B14F-4D97-AF65-F5344CB8AC3E}">
+        <p14:creationId xmlns:p14="http://schemas.microsoft.com/office/powerpoint/2010/main" val="1779215433"/>
+      </p:ext>
+    </p:extLst>
+  </p:cSld>
+  <p:clrMapOvr>
+    <a:masterClrMapping/>
+  </p:clrMapOvr>
+</p:sld>
+</file>
+
+<file path=ppt/slides/slide27.xml><?xml version="1.0" encoding="utf-8"?>
+<p:sld xmlns:a="http://schemas.openxmlformats.org/drawingml/2006/main" xmlns:r="http://schemas.openxmlformats.org/officeDocument/2006/relationships" xmlns:p="http://schemas.openxmlformats.org/presentationml/2006/main">
+  <p:cSld>
+    <p:spTree>
+      <p:nvGrpSpPr>
+        <p:cNvPr id="1" name=""/>
+        <p:cNvGrpSpPr/>
+        <p:nvPr/>
+      </p:nvGrpSpPr>
+      <p:grpSpPr>
+        <a:xfrm>
+          <a:off x="0" y="0"/>
+          <a:ext cx="0" cy="0"/>
+          <a:chOff x="0" y="0"/>
+          <a:chExt cx="0" cy="0"/>
+        </a:xfrm>
+      </p:grpSpPr>
+      <p:sp>
+        <p:nvSpPr>
+          <p:cNvPr id="2" name="Title 1"/>
+          <p:cNvSpPr>
+            <a:spLocks noGrp="1"/>
+          </p:cNvSpPr>
+          <p:nvPr>
+            <p:ph type="title"/>
+          </p:nvPr>
+        </p:nvSpPr>
+        <p:spPr>
+          <a:xfrm>
+            <a:off x="646111" y="452718"/>
+            <a:ext cx="9404723" cy="910569"/>
+          </a:xfrm>
+        </p:spPr>
+        <p:txBody>
+          <a:bodyPr/>
+          <a:lstStyle/>
+          <a:p>
+            <a:r>
+              <a:rPr lang="en-US" dirty="0"/>
+              <a:t>Native Image Conversion </a:t>
+            </a:r>
+            <a:r>
+              <a:rPr lang="en-US" sz="1800" dirty="0"/>
+              <a:t>(</a:t>
+            </a:r>
+            <a:r>
+              <a:rPr lang="en-US" sz="1800" dirty="0" err="1"/>
+              <a:t>Cont</a:t>
+            </a:r>
+            <a:r>
+              <a:rPr lang="en-US" sz="1800" dirty="0"/>
+              <a:t>)</a:t>
+            </a:r>
+          </a:p>
+        </p:txBody>
+      </p:sp>
+      <p:sp>
+        <p:nvSpPr>
+          <p:cNvPr id="3" name="Content Placeholder 2"/>
+          <p:cNvSpPr>
+            <a:spLocks noGrp="1"/>
+          </p:cNvSpPr>
+          <p:nvPr>
+            <p:ph idx="1"/>
+          </p:nvPr>
+        </p:nvSpPr>
+        <p:spPr>
+          <a:xfrm>
+            <a:off x="646111" y="1363287"/>
+            <a:ext cx="9403743" cy="5120639"/>
+          </a:xfrm>
+        </p:spPr>
+        <p:txBody>
+          <a:bodyPr>
+            <a:normAutofit/>
+          </a:bodyPr>
+          <a:lstStyle/>
+          <a:p>
+            <a:r>
+              <a:rPr lang="en-US" dirty="0"/>
+              <a:t>Detailed Build Process </a:t>
+            </a:r>
+            <a:r>
+              <a:rPr lang="en-US" sz="1100" dirty="0"/>
+              <a:t>(</a:t>
+            </a:r>
+            <a:r>
+              <a:rPr lang="en-US" sz="1100" dirty="0" err="1"/>
+              <a:t>Cont</a:t>
+            </a:r>
+            <a:r>
+              <a:rPr lang="en-US" sz="1100" dirty="0"/>
+              <a:t>)</a:t>
+            </a:r>
+          </a:p>
+          <a:p>
+            <a:pPr lvl="1">
+              <a:buFont typeface="Wingdings" panose="05000000000000000000" pitchFamily="2" charset="2"/>
+              <a:buChar char="Ø"/>
+            </a:pPr>
+            <a:r>
+              <a:rPr lang="en-US" dirty="0"/>
+              <a:t>Step 2</a:t>
+            </a:r>
+            <a:endParaRPr lang="en-US" dirty="0">
+              <a:solidFill>
+                <a:srgbClr val="000000"/>
+              </a:solidFill>
+            </a:endParaRPr>
+          </a:p>
+        </p:txBody>
+      </p:sp>
+    </p:spTree>
+    <p:extLst>
+      <p:ext uri="{BB962C8B-B14F-4D97-AF65-F5344CB8AC3E}">
+        <p14:creationId xmlns:p14="http://schemas.microsoft.com/office/powerpoint/2010/main" val="2554981032"/>
+      </p:ext>
+    </p:extLst>
+  </p:cSld>
+  <p:clrMapOvr>
+    <a:masterClrMapping/>
+  </p:clrMapOvr>
+</p:sld>
+</file>
+
+<file path=ppt/slides/slide28.xml><?xml version="1.0" encoding="utf-8"?>
+<p:sld xmlns:a="http://schemas.openxmlformats.org/drawingml/2006/main" xmlns:r="http://schemas.openxmlformats.org/officeDocument/2006/relationships" xmlns:p="http://schemas.openxmlformats.org/presentationml/2006/main">
+  <p:cSld>
+    <p:spTree>
+      <p:nvGrpSpPr>
+        <p:cNvPr id="1" name=""/>
+        <p:cNvGrpSpPr/>
+        <p:nvPr/>
+      </p:nvGrpSpPr>
+      <p:grpSpPr>
+        <a:xfrm>
+          <a:off x="0" y="0"/>
+          <a:ext cx="0" cy="0"/>
+          <a:chOff x="0" y="0"/>
+          <a:chExt cx="0" cy="0"/>
+        </a:xfrm>
+      </p:grpSpPr>
+      <p:sp>
+        <p:nvSpPr>
           <p:cNvPr id="2" name="Title 1">
             <a:extLst>
               <a:ext uri="{FF2B5EF4-FFF2-40B4-BE49-F238E27FC236}">
@@ -9718,7 +11764,7 @@
 </p:sld>
 </file>
 
-<file path=ppt/slides/slide23.xml><?xml version="1.0" encoding="utf-8"?>
+<file path=ppt/slides/slide29.xml><?xml version="1.0" encoding="utf-8"?>
 <p:sld xmlns:a="http://schemas.openxmlformats.org/drawingml/2006/main" xmlns:r="http://schemas.openxmlformats.org/officeDocument/2006/relationships" xmlns:p="http://schemas.openxmlformats.org/presentationml/2006/main">
   <p:cSld>
     <p:spTree>
@@ -9758,11 +11804,13 @@
           </a:xfrm>
         </p:spPr>
         <p:txBody>
-          <a:bodyPr anchor="t" anchorCtr="0"/>
+          <a:bodyPr anchor="t" anchorCtr="0">
+            <a:normAutofit/>
+          </a:bodyPr>
           <a:lstStyle/>
           <a:p>
             <a:r>
-              <a:rPr lang="en-US" dirty="0"/>
+              <a:rPr lang="en-US" sz="4200" dirty="0"/>
               <a:t>References</a:t>
             </a:r>
           </a:p>
@@ -9799,12 +11847,9 @@
               <a:buChar char="•"/>
             </a:pPr>
             <a:r>
-              <a:rPr lang="en-US" dirty="0">
-                <a:solidFill>
-                  <a:schemeClr val="accent3">
-                    <a:lumMod val="20000"/>
-                    <a:lumOff val="80000"/>
-                  </a:schemeClr>
+              <a:rPr lang="en-US" sz="1600" dirty="0">
+                <a:solidFill>
+                  <a:schemeClr val="accent2"/>
                 </a:solidFill>
                 <a:effectLst>
                   <a:glow rad="38100">
@@ -9828,78 +11873,11 @@
                   </a:extLst>
                 </a:hlinkClick>
               </a:rPr>
-              <a:t>Forbes: Meet the Team that Built </a:t>
-            </a:r>
-            <a:r>
-              <a:rPr lang="en-US" dirty="0" err="1">
-                <a:solidFill>
-                  <a:schemeClr val="accent3">
-                    <a:lumMod val="20000"/>
-                    <a:lumOff val="80000"/>
-                  </a:schemeClr>
-                </a:solidFill>
-                <a:effectLst>
-                  <a:glow rad="38100">
-                    <a:prstClr val="black">
-                      <a:lumMod val="50000"/>
-                      <a:lumOff val="50000"/>
-                      <a:alpha val="20000"/>
-                    </a:prstClr>
-                  </a:glow>
-                  <a:outerShdw blurRad="44450" dist="12700" dir="13860000" algn="tl" rotWithShape="0">
-                    <a:srgbClr val="000000">
-                      <a:alpha val="20000"/>
-                    </a:srgbClr>
-                  </a:outerShdw>
-                </a:effectLst>
-                <a:hlinkClick r:id="rId2">
-                  <a:extLst>
-                    <a:ext uri="{A12FA001-AC4F-418D-AE19-62706E023703}">
-                      <ahyp:hlinkClr xmlns:ahyp="http://schemas.microsoft.com/office/drawing/2018/hyperlinkcolor" val="tx"/>
-                    </a:ext>
-                  </a:extLst>
-                </a:hlinkClick>
-              </a:rPr>
-              <a:t>GraalVM</a:t>
-            </a:r>
-            <a:r>
-              <a:rPr lang="en-US" dirty="0">
-                <a:solidFill>
-                  <a:schemeClr val="accent3">
-                    <a:lumMod val="20000"/>
-                    <a:lumOff val="80000"/>
-                  </a:schemeClr>
-                </a:solidFill>
-                <a:effectLst>
-                  <a:glow rad="38100">
-                    <a:prstClr val="black">
-                      <a:lumMod val="50000"/>
-                      <a:lumOff val="50000"/>
-                      <a:alpha val="20000"/>
-                    </a:prstClr>
-                  </a:glow>
-                  <a:outerShdw blurRad="44450" dist="12700" dir="13860000" algn="tl" rotWithShape="0">
-                    <a:srgbClr val="000000">
-                      <a:alpha val="20000"/>
-                    </a:srgbClr>
-                  </a:outerShdw>
-                </a:effectLst>
-                <a:hlinkClick r:id="rId2">
-                  <a:extLst>
-                    <a:ext uri="{A12FA001-AC4F-418D-AE19-62706E023703}">
-                      <ahyp:hlinkClr xmlns:ahyp="http://schemas.microsoft.com/office/drawing/2018/hyperlinkcolor" val="tx"/>
-                    </a:ext>
-                  </a:extLst>
-                </a:hlinkClick>
-              </a:rPr>
-              <a:t>, an Energy-Saving Multi-Lingual Compiler Written Entirely in Java </a:t>
-            </a:r>
-            <a:endParaRPr lang="en-US" dirty="0">
+              <a:t>Forbes: Meet the Team that Built GraalVM, an Energy-Saving Multi-Lingual Compiler Written Entirely in Java </a:t>
+            </a:r>
+            <a:endParaRPr lang="en-US" sz="1600" dirty="0">
               <a:solidFill>
-                <a:schemeClr val="accent3">
-                  <a:lumMod val="20000"/>
-                  <a:lumOff val="80000"/>
-                </a:schemeClr>
+                <a:schemeClr val="accent2"/>
               </a:solidFill>
               <a:effectLst>
                 <a:glow rad="38100">
@@ -9923,12 +11901,9 @@
               <a:buChar char="•"/>
             </a:pPr>
             <a:r>
-              <a:rPr lang="en-US" dirty="0" err="1">
-                <a:solidFill>
-                  <a:schemeClr val="accent3">
-                    <a:lumMod val="20000"/>
-                    <a:lumOff val="80000"/>
-                  </a:schemeClr>
+              <a:rPr lang="en-US" sz="1600" dirty="0">
+                <a:solidFill>
+                  <a:schemeClr val="accent2"/>
                 </a:solidFill>
                 <a:effectLst>
                   <a:glow rad="38100">
@@ -9954,12 +11929,9 @@
               </a:rPr>
               <a:t>GraalVM</a:t>
             </a:r>
-            <a:endParaRPr lang="en-US" dirty="0">
+            <a:endParaRPr lang="en-US" sz="1600" dirty="0">
               <a:solidFill>
-                <a:schemeClr val="accent3">
-                  <a:lumMod val="20000"/>
-                  <a:lumOff val="80000"/>
-                </a:schemeClr>
+                <a:schemeClr val="accent2"/>
               </a:solidFill>
               <a:effectLst>
                 <a:glow rad="38100">
@@ -9983,12 +11955,9 @@
               <a:buChar char="•"/>
             </a:pPr>
             <a:r>
-              <a:rPr lang="en-US" dirty="0">
-                <a:solidFill>
-                  <a:schemeClr val="accent3">
-                    <a:lumMod val="20000"/>
-                    <a:lumOff val="80000"/>
-                  </a:schemeClr>
+              <a:rPr lang="en-US" sz="1600" dirty="0">
+                <a:solidFill>
+                  <a:schemeClr val="accent2"/>
                 </a:solidFill>
                 <a:effectLst>
                   <a:glow rad="38100">
@@ -10014,12 +11983,9 @@
               </a:rPr>
               <a:t>OpenJDK JEP Index</a:t>
             </a:r>
-            <a:endParaRPr lang="en-US" dirty="0">
+            <a:endParaRPr lang="en-US" sz="1600" dirty="0">
               <a:solidFill>
-                <a:schemeClr val="accent3">
-                  <a:lumMod val="20000"/>
-                  <a:lumOff val="80000"/>
-                </a:schemeClr>
+                <a:schemeClr val="accent2"/>
               </a:solidFill>
               <a:effectLst>
                 <a:glow rad="38100">
@@ -10043,12 +12009,9 @@
               <a:buChar char="•"/>
             </a:pPr>
             <a:r>
-              <a:rPr lang="en-US" dirty="0">
-                <a:solidFill>
-                  <a:schemeClr val="accent3">
-                    <a:lumMod val="20000"/>
-                    <a:lumOff val="80000"/>
-                  </a:schemeClr>
+              <a:rPr lang="en-US" sz="1600" dirty="0">
+                <a:solidFill>
+                  <a:schemeClr val="accent2"/>
                 </a:solidFill>
                 <a:effectLst>
                   <a:glow rad="38100">
@@ -10074,12 +12037,308 @@
               </a:rPr>
               <a:t>Java 17 Features: A comparison between versions 8 and 17. What has changed over the years?</a:t>
             </a:r>
-            <a:endParaRPr lang="en-US" dirty="0">
+            <a:endParaRPr lang="en-US" sz="1600" dirty="0">
               <a:solidFill>
-                <a:schemeClr val="accent3">
-                  <a:lumMod val="20000"/>
-                  <a:lumOff val="80000"/>
-                </a:schemeClr>
+                <a:schemeClr val="accent2"/>
+              </a:solidFill>
+              <a:effectLst>
+                <a:glow rad="38100">
+                  <a:prstClr val="black">
+                    <a:lumMod val="50000"/>
+                    <a:lumOff val="50000"/>
+                    <a:alpha val="20000"/>
+                  </a:prstClr>
+                </a:glow>
+                <a:outerShdw blurRad="44450" dist="12700" dir="13860000" algn="tl" rotWithShape="0">
+                  <a:srgbClr val="000000">
+                    <a:alpha val="20000"/>
+                  </a:srgbClr>
+                </a:outerShdw>
+              </a:effectLst>
+            </a:endParaRPr>
+          </a:p>
+          <a:p>
+            <a:pPr marL="285750" indent="-285750">
+              <a:buFont typeface="Arial" panose="020B0604020202020204" pitchFamily="34" charset="0"/>
+              <a:buChar char="•"/>
+            </a:pPr>
+            <a:r>
+              <a:rPr lang="en-US" sz="1600" dirty="0">
+                <a:solidFill>
+                  <a:schemeClr val="accent2"/>
+                </a:solidFill>
+                <a:effectLst>
+                  <a:glow rad="38100">
+                    <a:prstClr val="black">
+                      <a:lumMod val="50000"/>
+                      <a:lumOff val="50000"/>
+                      <a:alpha val="20000"/>
+                    </a:prstClr>
+                  </a:glow>
+                  <a:outerShdw blurRad="44450" dist="12700" dir="13860000" algn="tl" rotWithShape="0">
+                    <a:srgbClr val="000000">
+                      <a:alpha val="20000"/>
+                    </a:srgbClr>
+                  </a:outerShdw>
+                </a:effectLst>
+                <a:hlinkClick r:id="rId6">
+                  <a:extLst>
+                    <a:ext uri="{A12FA001-AC4F-418D-AE19-62706E023703}">
+                      <ahyp:hlinkClr xmlns:ahyp="http://schemas.microsoft.com/office/drawing/2018/hyperlinkcolor" val="tx"/>
+                    </a:ext>
+                  </a:extLst>
+                </a:hlinkClick>
+              </a:rPr>
+              <a:t>Understanding Reflection and GraalVM Native Image</a:t>
+            </a:r>
+            <a:endParaRPr lang="en-US" sz="1600" dirty="0">
+              <a:solidFill>
+                <a:schemeClr val="accent2"/>
+              </a:solidFill>
+              <a:effectLst>
+                <a:glow rad="38100">
+                  <a:prstClr val="black">
+                    <a:lumMod val="50000"/>
+                    <a:lumOff val="50000"/>
+                    <a:alpha val="20000"/>
+                  </a:prstClr>
+                </a:glow>
+                <a:outerShdw blurRad="44450" dist="12700" dir="13860000" algn="tl" rotWithShape="0">
+                  <a:srgbClr val="000000">
+                    <a:alpha val="20000"/>
+                  </a:srgbClr>
+                </a:outerShdw>
+              </a:effectLst>
+            </a:endParaRPr>
+          </a:p>
+          <a:p>
+            <a:pPr marL="285750" indent="-285750">
+              <a:buFont typeface="Arial" panose="020B0604020202020204" pitchFamily="34" charset="0"/>
+              <a:buChar char="•"/>
+            </a:pPr>
+            <a:r>
+              <a:rPr lang="en-US" sz="1600" dirty="0" err="1">
+                <a:solidFill>
+                  <a:schemeClr val="accent2"/>
+                </a:solidFill>
+                <a:effectLst>
+                  <a:glow rad="38100">
+                    <a:prstClr val="black">
+                      <a:lumMod val="50000"/>
+                      <a:lumOff val="50000"/>
+                      <a:alpha val="20000"/>
+                    </a:prstClr>
+                  </a:glow>
+                  <a:outerShdw blurRad="44450" dist="12700" dir="13860000" algn="tl" rotWithShape="0">
+                    <a:srgbClr val="000000">
+                      <a:alpha val="20000"/>
+                    </a:srgbClr>
+                  </a:outerShdw>
+                </a:effectLst>
+                <a:hlinkClick r:id="rId7">
+                  <a:extLst>
+                    <a:ext uri="{A12FA001-AC4F-418D-AE19-62706E023703}">
+                      <ahyp:hlinkClr xmlns:ahyp="http://schemas.microsoft.com/office/drawing/2018/hyperlinkcolor" val="tx"/>
+                    </a:ext>
+                  </a:extLst>
+                </a:hlinkClick>
+              </a:rPr>
+              <a:t>GraalVm</a:t>
+            </a:r>
+            <a:r>
+              <a:rPr lang="en-US" sz="1600" dirty="0">
+                <a:solidFill>
+                  <a:schemeClr val="accent2"/>
+                </a:solidFill>
+                <a:effectLst>
+                  <a:glow rad="38100">
+                    <a:prstClr val="black">
+                      <a:lumMod val="50000"/>
+                      <a:lumOff val="50000"/>
+                      <a:alpha val="20000"/>
+                    </a:prstClr>
+                  </a:glow>
+                  <a:outerShdw blurRad="44450" dist="12700" dir="13860000" algn="tl" rotWithShape="0">
+                    <a:srgbClr val="000000">
+                      <a:alpha val="20000"/>
+                    </a:srgbClr>
+                  </a:outerShdw>
+                </a:effectLst>
+                <a:hlinkClick r:id="rId7">
+                  <a:extLst>
+                    <a:ext uri="{A12FA001-AC4F-418D-AE19-62706E023703}">
+                      <ahyp:hlinkClr xmlns:ahyp="http://schemas.microsoft.com/office/drawing/2018/hyperlinkcolor" val="tx"/>
+                    </a:ext>
+                  </a:extLst>
+                </a:hlinkClick>
+              </a:rPr>
+              <a:t> v22.2 Reference Manuals</a:t>
+            </a:r>
+            <a:endParaRPr lang="en-US" sz="1600" dirty="0">
+              <a:solidFill>
+                <a:schemeClr val="accent2"/>
+              </a:solidFill>
+              <a:effectLst>
+                <a:glow rad="38100">
+                  <a:prstClr val="black">
+                    <a:lumMod val="50000"/>
+                    <a:lumOff val="50000"/>
+                    <a:alpha val="20000"/>
+                  </a:prstClr>
+                </a:glow>
+                <a:outerShdw blurRad="44450" dist="12700" dir="13860000" algn="tl" rotWithShape="0">
+                  <a:srgbClr val="000000">
+                    <a:alpha val="20000"/>
+                  </a:srgbClr>
+                </a:outerShdw>
+              </a:effectLst>
+            </a:endParaRPr>
+          </a:p>
+          <a:p>
+            <a:pPr marL="285750" indent="-285750">
+              <a:buFont typeface="Arial" panose="020B0604020202020204" pitchFamily="34" charset="0"/>
+              <a:buChar char="•"/>
+            </a:pPr>
+            <a:r>
+              <a:rPr lang="en-US" sz="1600" dirty="0">
+                <a:solidFill>
+                  <a:schemeClr val="accent2"/>
+                </a:solidFill>
+                <a:effectLst>
+                  <a:glow rad="38100">
+                    <a:prstClr val="black">
+                      <a:lumMod val="50000"/>
+                      <a:lumOff val="50000"/>
+                      <a:alpha val="20000"/>
+                    </a:prstClr>
+                  </a:glow>
+                  <a:outerShdw blurRad="44450" dist="12700" dir="13860000" algn="tl" rotWithShape="0">
+                    <a:srgbClr val="000000">
+                      <a:alpha val="20000"/>
+                    </a:srgbClr>
+                  </a:outerShdw>
+                </a:effectLst>
+                <a:hlinkClick r:id="rId8">
+                  <a:extLst>
+                    <a:ext uri="{A12FA001-AC4F-418D-AE19-62706E023703}">
+                      <ahyp:hlinkClr xmlns:ahyp="http://schemas.microsoft.com/office/drawing/2018/hyperlinkcolor" val="tx"/>
+                    </a:ext>
+                  </a:extLst>
+                </a:hlinkClick>
+              </a:rPr>
+              <a:t>Qpid GraalVM Project</a:t>
+            </a:r>
+            <a:endParaRPr lang="en-US" sz="1600" dirty="0">
+              <a:solidFill>
+                <a:schemeClr val="accent2"/>
+              </a:solidFill>
+              <a:effectLst>
+                <a:glow rad="38100">
+                  <a:prstClr val="black">
+                    <a:lumMod val="50000"/>
+                    <a:lumOff val="50000"/>
+                    <a:alpha val="20000"/>
+                  </a:prstClr>
+                </a:glow>
+                <a:outerShdw blurRad="44450" dist="12700" dir="13860000" algn="tl" rotWithShape="0">
+                  <a:srgbClr val="000000">
+                    <a:alpha val="20000"/>
+                  </a:srgbClr>
+                </a:outerShdw>
+              </a:effectLst>
+            </a:endParaRPr>
+          </a:p>
+          <a:p>
+            <a:pPr marL="285750" indent="-285750">
+              <a:buFont typeface="Arial" panose="020B0604020202020204" pitchFamily="34" charset="0"/>
+              <a:buChar char="•"/>
+            </a:pPr>
+            <a:r>
+              <a:rPr lang="en-US" sz="1600" dirty="0">
+                <a:solidFill>
+                  <a:schemeClr val="accent2"/>
+                </a:solidFill>
+                <a:effectLst>
+                  <a:glow rad="38100">
+                    <a:prstClr val="black">
+                      <a:lumMod val="50000"/>
+                      <a:lumOff val="50000"/>
+                      <a:alpha val="20000"/>
+                    </a:prstClr>
+                  </a:glow>
+                  <a:outerShdw blurRad="44450" dist="12700" dir="13860000" algn="tl" rotWithShape="0">
+                    <a:srgbClr val="000000">
+                      <a:alpha val="20000"/>
+                    </a:srgbClr>
+                  </a:outerShdw>
+                </a:effectLst>
+                <a:hlinkClick r:id="rId9">
+                  <a:extLst>
+                    <a:ext uri="{A12FA001-AC4F-418D-AE19-62706E023703}">
+                      <ahyp:hlinkClr xmlns:ahyp="http://schemas.microsoft.com/office/drawing/2018/hyperlinkcolor" val="tx"/>
+                    </a:ext>
+                  </a:extLst>
+                </a:hlinkClick>
+              </a:rPr>
+              <a:t>Native Image Compatibility Guide</a:t>
+            </a:r>
+            <a:endParaRPr lang="en-US" sz="1600" dirty="0">
+              <a:solidFill>
+                <a:schemeClr val="accent2"/>
+              </a:solidFill>
+              <a:effectLst>
+                <a:glow rad="38100">
+                  <a:prstClr val="black">
+                    <a:lumMod val="50000"/>
+                    <a:lumOff val="50000"/>
+                    <a:alpha val="20000"/>
+                  </a:prstClr>
+                </a:glow>
+                <a:outerShdw blurRad="44450" dist="12700" dir="13860000" algn="tl" rotWithShape="0">
+                  <a:srgbClr val="000000">
+                    <a:alpha val="20000"/>
+                  </a:srgbClr>
+                </a:outerShdw>
+              </a:effectLst>
+            </a:endParaRPr>
+          </a:p>
+          <a:p>
+            <a:pPr marL="285750" indent="-285750">
+              <a:buFont typeface="Arial" panose="020B0604020202020204" pitchFamily="34" charset="0"/>
+              <a:buChar char="•"/>
+            </a:pPr>
+            <a:r>
+              <a:rPr lang="en-US" sz="1600" dirty="0">
+                <a:solidFill>
+                  <a:schemeClr val="accent2"/>
+                </a:solidFill>
+                <a:effectLst>
+                  <a:glow rad="38100">
+                    <a:prstClr val="black">
+                      <a:lumMod val="50000"/>
+                      <a:lumOff val="50000"/>
+                      <a:alpha val="20000"/>
+                    </a:prstClr>
+                  </a:glow>
+                  <a:outerShdw blurRad="44450" dist="12700" dir="13860000" algn="tl" rotWithShape="0">
+                    <a:srgbClr val="000000">
+                      <a:alpha val="20000"/>
+                    </a:srgbClr>
+                  </a:outerShdw>
+                </a:effectLst>
+                <a:hlinkClick r:id="rId10">
+                  <a:extLst>
+                    <a:ext uri="{A12FA001-AC4F-418D-AE19-62706E023703}">
+                      <ahyp:hlinkClr xmlns:ahyp="http://schemas.microsoft.com/office/drawing/2018/hyperlinkcolor" val="tx"/>
+                    </a:ext>
+                  </a:extLst>
+                </a:hlinkClick>
+              </a:rPr>
+              <a:t>Spring Native Image Documentation</a:t>
+            </a:r>
+            <a:endParaRPr lang="en-US" sz="1600" dirty="0">
+              <a:solidFill>
+                <a:schemeClr val="accent2"/>
               </a:solidFill>
               <a:effectLst>
                 <a:glow rad="38100">
@@ -10461,15 +12720,7 @@
             </a:pPr>
             <a:r>
               <a:rPr lang="en-US" dirty="0"/>
-              <a:t>Oracle sponsored Java 17 webinar including focus on </a:t>
-            </a:r>
-            <a:r>
-              <a:rPr lang="en-US" dirty="0" err="1"/>
-              <a:t>GraalVM</a:t>
-            </a:r>
-            <a:r>
-              <a:rPr lang="en-US" dirty="0"/>
-              <a:t> in 2021</a:t>
+              <a:t>Oracle sponsored Java 17 webinar including focus on GraalVM in 2021</a:t>
             </a:r>
           </a:p>
         </p:txBody>
@@ -10644,12 +12895,8 @@
               <a:buChar char="§"/>
             </a:pPr>
             <a:r>
-              <a:rPr lang="en-US" dirty="0" err="1"/>
-              <a:t>GraalVM</a:t>
-            </a:r>
-            <a:r>
-              <a:rPr lang="en-US" dirty="0"/>
-              <a:t> further tightens security and improves performance</a:t>
+              <a:rPr lang="en-US" dirty="0"/>
+              <a:t>GraalVM further tightens security and improves performance</a:t>
             </a:r>
           </a:p>
         </p:txBody>
@@ -10890,15 +13137,7 @@
             </a:pPr>
             <a:r>
               <a:rPr lang="en-US" dirty="0"/>
-              <a:t>Improved </a:t>
-            </a:r>
-            <a:r>
-              <a:rPr lang="en-US" dirty="0" err="1"/>
-              <a:t>GraalVM</a:t>
-            </a:r>
-            <a:r>
-              <a:rPr lang="en-US" dirty="0"/>
-              <a:t> Compiler</a:t>
+              <a:t>Improved GraalVM Compiler</a:t>
             </a:r>
           </a:p>
         </p:txBody>
@@ -11165,12 +13404,8 @@
           <a:p>
             <a:pPr algn="l"/>
             <a:r>
-              <a:rPr lang="en-US" dirty="0" err="1"/>
-              <a:t>GraalVM</a:t>
-            </a:r>
-            <a:r>
-              <a:rPr lang="en-US" dirty="0"/>
-              <a:t> Overview</a:t>
+              <a:rPr lang="en-US" dirty="0"/>
+              <a:t>GraalVM Overview</a:t>
             </a:r>
           </a:p>
         </p:txBody>

</xml_diff>

<commit_message>
Java 17 Upgrade PPT v2
</commit_message>
<xml_diff>
--- a/doc/reference/GraalVm _Upgrade.pptx
+++ b/doc/reference/GraalVm _Upgrade.pptx
@@ -866,7 +866,7 @@
           <a:p>
             <a:fld id="{4AAD347D-5ACD-4C99-B74B-A9C85AD731AF}" type="datetimeFigureOut">
               <a:rPr lang="en-US" smtClean="0"/>
-              <a:t>10/31/2022</a:t>
+              <a:t>11/1/2022</a:t>
             </a:fld>
             <a:endParaRPr lang="en-US" dirty="0"/>
           </a:p>
@@ -1117,7 +1117,7 @@
           <a:p>
             <a:fld id="{4AAD347D-5ACD-4C99-B74B-A9C85AD731AF}" type="datetimeFigureOut">
               <a:rPr lang="en-US" smtClean="0"/>
-              <a:t>10/31/2022</a:t>
+              <a:t>11/1/2022</a:t>
             </a:fld>
             <a:endParaRPr lang="en-US" dirty="0"/>
           </a:p>
@@ -1432,7 +1432,7 @@
           <a:p>
             <a:fld id="{4AAD347D-5ACD-4C99-B74B-A9C85AD731AF}" type="datetimeFigureOut">
               <a:rPr lang="en-US" smtClean="0"/>
-              <a:t>10/31/2022</a:t>
+              <a:t>11/1/2022</a:t>
             </a:fld>
             <a:endParaRPr lang="en-US" dirty="0"/>
           </a:p>
@@ -1774,7 +1774,7 @@
           <a:p>
             <a:fld id="{4509A250-FF31-4206-8172-F9D3106AACB1}" type="datetimeFigureOut">
               <a:rPr lang="en-US" smtClean="0"/>
-              <a:t>10/31/2022</a:t>
+              <a:t>11/1/2022</a:t>
             </a:fld>
             <a:endParaRPr lang="en-US" dirty="0"/>
           </a:p>
@@ -2088,7 +2088,7 @@
           <a:p>
             <a:fld id="{4AAD347D-5ACD-4C99-B74B-A9C85AD731AF}" type="datetimeFigureOut">
               <a:rPr lang="en-US" smtClean="0"/>
-              <a:t>10/31/2022</a:t>
+              <a:t>11/1/2022</a:t>
             </a:fld>
             <a:endParaRPr lang="en-US" dirty="0"/>
           </a:p>
@@ -2482,7 +2482,7 @@
           <a:p>
             <a:fld id="{4AAD347D-5ACD-4C99-B74B-A9C85AD731AF}" type="datetimeFigureOut">
               <a:rPr lang="en-US" smtClean="0"/>
-              <a:t>10/31/2022</a:t>
+              <a:t>11/1/2022</a:t>
             </a:fld>
             <a:endParaRPr lang="en-US" dirty="0"/>
           </a:p>
@@ -2653,7 +2653,7 @@
           <a:p>
             <a:fld id="{4509A250-FF31-4206-8172-F9D3106AACB1}" type="datetimeFigureOut">
               <a:rPr lang="en-US" smtClean="0"/>
-              <a:t>10/31/2022</a:t>
+              <a:t>11/1/2022</a:t>
             </a:fld>
             <a:endParaRPr lang="en-US" dirty="0"/>
           </a:p>
@@ -2833,7 +2833,7 @@
           <a:p>
             <a:fld id="{4509A250-FF31-4206-8172-F9D3106AACB1}" type="datetimeFigureOut">
               <a:rPr lang="en-US" smtClean="0"/>
-              <a:t>10/31/2022</a:t>
+              <a:t>11/1/2022</a:t>
             </a:fld>
             <a:endParaRPr lang="en-US" dirty="0"/>
           </a:p>
@@ -3009,7 +3009,7 @@
           <a:p>
             <a:fld id="{4509A250-FF31-4206-8172-F9D3106AACB1}" type="datetimeFigureOut">
               <a:rPr lang="en-US" smtClean="0"/>
-              <a:t>10/31/2022</a:t>
+              <a:t>11/1/2022</a:t>
             </a:fld>
             <a:endParaRPr lang="en-US" dirty="0"/>
           </a:p>
@@ -3256,7 +3256,7 @@
           <a:p>
             <a:fld id="{9796027F-7875-4030-9381-8BD8C4F21935}" type="datetimeFigureOut">
               <a:rPr lang="en-US" smtClean="0"/>
-              <a:t>10/31/2022</a:t>
+              <a:t>11/1/2022</a:t>
             </a:fld>
             <a:endParaRPr lang="en-US" dirty="0"/>
           </a:p>
@@ -3488,7 +3488,7 @@
           <a:p>
             <a:fld id="{9796027F-7875-4030-9381-8BD8C4F21935}" type="datetimeFigureOut">
               <a:rPr lang="en-US" smtClean="0"/>
-              <a:t>10/31/2022</a:t>
+              <a:t>11/1/2022</a:t>
             </a:fld>
             <a:endParaRPr lang="en-US" dirty="0"/>
           </a:p>
@@ -3862,7 +3862,7 @@
           <a:p>
             <a:fld id="{9796027F-7875-4030-9381-8BD8C4F21935}" type="datetimeFigureOut">
               <a:rPr lang="en-US" smtClean="0"/>
-              <a:t>10/31/2022</a:t>
+              <a:t>11/1/2022</a:t>
             </a:fld>
             <a:endParaRPr lang="en-US" dirty="0"/>
           </a:p>
@@ -3985,7 +3985,7 @@
           <a:p>
             <a:fld id="{4509A250-FF31-4206-8172-F9D3106AACB1}" type="datetimeFigureOut">
               <a:rPr lang="en-US" smtClean="0"/>
-              <a:t>10/31/2022</a:t>
+              <a:t>11/1/2022</a:t>
             </a:fld>
             <a:endParaRPr lang="en-US" dirty="0"/>
           </a:p>
@@ -4080,7 +4080,7 @@
           <a:p>
             <a:fld id="{4509A250-FF31-4206-8172-F9D3106AACB1}" type="datetimeFigureOut">
               <a:rPr lang="en-US" smtClean="0"/>
-              <a:t>10/31/2022</a:t>
+              <a:t>11/1/2022</a:t>
             </a:fld>
             <a:endParaRPr lang="en-US" dirty="0"/>
           </a:p>
@@ -4335,7 +4335,7 @@
           <a:p>
             <a:fld id="{4509A250-FF31-4206-8172-F9D3106AACB1}" type="datetimeFigureOut">
               <a:rPr lang="en-US" smtClean="0"/>
-              <a:t>10/31/2022</a:t>
+              <a:t>11/1/2022</a:t>
             </a:fld>
             <a:endParaRPr lang="en-US" dirty="0"/>
           </a:p>
@@ -4598,7 +4598,7 @@
           <a:p>
             <a:fld id="{4509A250-FF31-4206-8172-F9D3106AACB1}" type="datetimeFigureOut">
               <a:rPr lang="en-US" smtClean="0"/>
-              <a:t>10/31/2022</a:t>
+              <a:t>11/1/2022</a:t>
             </a:fld>
             <a:endParaRPr lang="en-US" dirty="0"/>
           </a:p>
@@ -5341,7 +5341,7 @@
           <a:p>
             <a:fld id="{4AAD347D-5ACD-4C99-B74B-A9C85AD731AF}" type="datetimeFigureOut">
               <a:rPr lang="en-US" smtClean="0"/>
-              <a:t>10/31/2022</a:t>
+              <a:t>11/1/2022</a:t>
             </a:fld>
             <a:endParaRPr lang="en-US" dirty="0"/>
           </a:p>
@@ -17257,7 +17257,7 @@
                   </a:extLst>
                 </a:hlinkClick>
               </a:rPr>
-              <a:t>Native Image Build Configuration</a:t>
+              <a:t>Java 17 Upgrade</a:t>
             </a:r>
             <a:endParaRPr lang="en-US" sz="1600" dirty="0">
               <a:solidFill>
@@ -17301,7 +17301,7 @@
                   </a:extLst>
                 </a:hlinkClick>
               </a:rPr>
-              <a:t>Native Image Compatibility Guide</a:t>
+              <a:t>Native Image Build Configuration</a:t>
             </a:r>
             <a:endParaRPr lang="en-US" sz="1600" dirty="0">
               <a:solidFill>
@@ -17345,7 +17345,7 @@
                   </a:extLst>
                 </a:hlinkClick>
               </a:rPr>
-              <a:t>OpenJDK JEP Index</a:t>
+              <a:t>Native Image Compatibility Guide</a:t>
             </a:r>
             <a:endParaRPr lang="en-US" sz="1600" dirty="0">
               <a:solidFill>
@@ -17389,7 +17389,7 @@
                   </a:extLst>
                 </a:hlinkClick>
               </a:rPr>
-              <a:t>Qpid GraalVM Project</a:t>
+              <a:t>OpenJDK JEP Index</a:t>
             </a:r>
             <a:endParaRPr lang="en-US" sz="1600" dirty="0">
               <a:solidFill>
@@ -17433,7 +17433,7 @@
                   </a:extLst>
                 </a:hlinkClick>
               </a:rPr>
-              <a:t>Sdkman!</a:t>
+              <a:t>Qpid GraalVM Project</a:t>
             </a:r>
             <a:endParaRPr lang="en-US" sz="1600" dirty="0">
               <a:solidFill>
@@ -17477,7 +17477,7 @@
                   </a:extLst>
                 </a:hlinkClick>
               </a:rPr>
-              <a:t>Spring Native Image Documentation</a:t>
+              <a:t>Sdkman!</a:t>
             </a:r>
             <a:endParaRPr lang="en-US" sz="1600" dirty="0">
               <a:solidFill>
@@ -17514,6 +17514,50 @@
                   </a:glow>
                 </a:effectLst>
                 <a:hlinkClick r:id="rId12">
+                  <a:extLst>
+                    <a:ext uri="{A12FA001-AC4F-418D-AE19-62706E023703}">
+                      <ahyp:hlinkClr xmlns:ahyp="http://schemas.microsoft.com/office/drawing/2018/hyperlinkcolor" val="tx"/>
+                    </a:ext>
+                  </a:extLst>
+                </a:hlinkClick>
+              </a:rPr>
+              <a:t>Spring Native Image Documentation</a:t>
+            </a:r>
+            <a:endParaRPr lang="en-US" sz="1600" dirty="0">
+              <a:solidFill>
+                <a:schemeClr val="accent2"/>
+              </a:solidFill>
+              <a:effectLst>
+                <a:glow rad="38100">
+                  <a:prstClr val="black">
+                    <a:lumMod val="50000"/>
+                    <a:lumOff val="50000"/>
+                    <a:alpha val="20000"/>
+                  </a:prstClr>
+                </a:glow>
+              </a:effectLst>
+            </a:endParaRPr>
+          </a:p>
+          <a:p>
+            <a:pPr marL="285750" indent="-285750">
+              <a:buFont typeface="Arial" panose="020B0604020202020204" pitchFamily="34" charset="0"/>
+              <a:buChar char="•"/>
+            </a:pPr>
+            <a:r>
+              <a:rPr lang="en-US" sz="1600" dirty="0">
+                <a:solidFill>
+                  <a:schemeClr val="accent2"/>
+                </a:solidFill>
+                <a:effectLst>
+                  <a:glow rad="38100">
+                    <a:prstClr val="black">
+                      <a:lumMod val="50000"/>
+                      <a:lumOff val="50000"/>
+                      <a:alpha val="20000"/>
+                    </a:prstClr>
+                  </a:glow>
+                </a:effectLst>
+                <a:hlinkClick r:id="rId13">
                   <a:extLst>
                     <a:ext uri="{A12FA001-AC4F-418D-AE19-62706E023703}">
                       <ahyp:hlinkClr xmlns:ahyp="http://schemas.microsoft.com/office/drawing/2018/hyperlinkcolor" val="tx"/>
@@ -18288,12 +18332,8 @@
               <a:buChar char="Ø"/>
             </a:pPr>
             <a:r>
-              <a:rPr lang="en-US"/>
-              <a:t> JEP </a:t>
-            </a:r>
-            <a:r>
-              <a:rPr lang="en-US" dirty="0"/>
-              <a:t>403: Strongly Encapsulate JDK Internals</a:t>
+              <a:rPr lang="en-US" dirty="0"/>
+              <a:t> JEP 403: Strongly Encapsulate JDK Internals</a:t>
             </a:r>
           </a:p>
           <a:p>
@@ -18351,6 +18391,42 @@
               <a:rPr lang="en-US" dirty="0"/>
               <a:t>No-Op (memory profiling)</a:t>
             </a:r>
+          </a:p>
+          <a:p>
+            <a:pPr>
+              <a:buFont typeface="Wingdings" panose="05000000000000000000" pitchFamily="2" charset="2"/>
+              <a:buChar char="Ø"/>
+            </a:pPr>
+            <a:r>
+              <a:rPr lang="en-US" dirty="0"/>
+              <a:t>Java 17 Upgrade Details</a:t>
+            </a:r>
+          </a:p>
+          <a:p>
+            <a:pPr lvl="1">
+              <a:buFont typeface="Wingdings" panose="05000000000000000000" pitchFamily="2" charset="2"/>
+              <a:buChar char="Ø"/>
+            </a:pPr>
+            <a:r>
+              <a:rPr lang="en-US" dirty="0">
+                <a:solidFill>
+                  <a:schemeClr val="accent2"/>
+                </a:solidFill>
+                <a:hlinkClick r:id="rId2">
+                  <a:extLst>
+                    <a:ext uri="{A12FA001-AC4F-418D-AE19-62706E023703}">
+                      <ahyp:hlinkClr xmlns:ahyp="http://schemas.microsoft.com/office/drawing/2018/hyperlinkcolor" val="tx"/>
+                    </a:ext>
+                  </a:extLst>
+                </a:hlinkClick>
+              </a:rPr>
+              <a:t>Java 17 Upgrade</a:t>
+            </a:r>
+            <a:endParaRPr lang="en-US" dirty="0">
+              <a:solidFill>
+                <a:schemeClr val="accent2"/>
+              </a:solidFill>
+            </a:endParaRPr>
           </a:p>
         </p:txBody>
       </p:sp>

</xml_diff>